<commit_message>
Added Fine-Grained Access Control
I have added the Fine-Grained Access Control subchapter.
</commit_message>
<xml_diff>
--- a/Access Control for XML - Presentation.pptx
+++ b/Access Control for XML - Presentation.pptx
@@ -23,6 +23,8 @@
     <p:sldId id="268" r:id="rId18"/>
     <p:sldId id="269" r:id="rId19"/>
     <p:sldId id="270" r:id="rId20"/>
+    <p:sldId id="271" r:id="rId21"/>
+    <p:sldId id="272" r:id="rId22"/>
   </p:sldIdLst>
   <p:sldSz cy="5143500" cx="9144000"/>
   <p:notesSz cx="6858000" cy="9144000"/>
@@ -818,7 +820,7 @@
       </p:grpSpPr>
       <p:sp>
         <p:nvSpPr>
-          <p:cNvPr id="113" name="Google Shape;113;g324d1e3a553_0_405:notes"/>
+          <p:cNvPr id="113" name="Google Shape;113;g324d1e3a553_0_392:notes"/>
           <p:cNvSpPr/>
           <p:nvPr>
             <p:ph idx="2" type="sldImg"/>
@@ -853,7 +855,7 @@
       </p:sp>
       <p:sp>
         <p:nvSpPr>
-          <p:cNvPr id="114" name="Google Shape;114;g324d1e3a553_0_405:notes"/>
+          <p:cNvPr id="114" name="Google Shape;114;g324d1e3a553_0_392:notes"/>
           <p:cNvSpPr txBox="1"/>
           <p:nvPr>
             <p:ph idx="1" type="body"/>
@@ -917,7 +919,7 @@
       </p:grpSpPr>
       <p:sp>
         <p:nvSpPr>
-          <p:cNvPr id="120" name="Google Shape;120;g324d1e3a553_0_412:notes"/>
+          <p:cNvPr id="120" name="Google Shape;120;g324d1e3a553_0_399:notes"/>
           <p:cNvSpPr/>
           <p:nvPr>
             <p:ph idx="2" type="sldImg"/>
@@ -952,7 +954,7 @@
       </p:sp>
       <p:sp>
         <p:nvSpPr>
-          <p:cNvPr id="121" name="Google Shape;121;g324d1e3a553_0_412:notes"/>
+          <p:cNvPr id="121" name="Google Shape;121;g324d1e3a553_0_399:notes"/>
           <p:cNvSpPr txBox="1"/>
           <p:nvPr>
             <p:ph idx="1" type="body"/>
@@ -1016,7 +1018,7 @@
       </p:grpSpPr>
       <p:sp>
         <p:nvSpPr>
-          <p:cNvPr id="127" name="Google Shape;127;g324d1e3a553_0_420:notes"/>
+          <p:cNvPr id="127" name="Google Shape;127;g324d1e3a553_0_405:notes"/>
           <p:cNvSpPr/>
           <p:nvPr>
             <p:ph idx="2" type="sldImg"/>
@@ -1051,7 +1053,7 @@
       </p:sp>
       <p:sp>
         <p:nvSpPr>
-          <p:cNvPr id="128" name="Google Shape;128;g324d1e3a553_0_420:notes"/>
+          <p:cNvPr id="128" name="Google Shape;128;g324d1e3a553_0_405:notes"/>
           <p:cNvSpPr txBox="1"/>
           <p:nvPr>
             <p:ph idx="1" type="body"/>
@@ -1115,7 +1117,7 @@
       </p:grpSpPr>
       <p:sp>
         <p:nvSpPr>
-          <p:cNvPr id="134" name="Google Shape;134;g324d1e3a553_0_427:notes"/>
+          <p:cNvPr id="134" name="Google Shape;134;g324d1e3a553_0_412:notes"/>
           <p:cNvSpPr/>
           <p:nvPr>
             <p:ph idx="2" type="sldImg"/>
@@ -1150,7 +1152,7 @@
       </p:sp>
       <p:sp>
         <p:nvSpPr>
-          <p:cNvPr id="135" name="Google Shape;135;g324d1e3a553_0_427:notes"/>
+          <p:cNvPr id="135" name="Google Shape;135;g324d1e3a553_0_412:notes"/>
           <p:cNvSpPr txBox="1"/>
           <p:nvPr>
             <p:ph idx="1" type="body"/>
@@ -1200,7 +1202,7 @@
   <p:cSld>
     <p:spTree>
       <p:nvGrpSpPr>
-        <p:cNvPr id="139" name="Shape 139"/>
+        <p:cNvPr id="140" name="Shape 140"/>
         <p:cNvGrpSpPr/>
         <p:nvPr/>
       </p:nvGrpSpPr>
@@ -1214,7 +1216,7 @@
       </p:grpSpPr>
       <p:sp>
         <p:nvSpPr>
-          <p:cNvPr id="140" name="Google Shape;140;g324d1e3a553_0_434:notes"/>
+          <p:cNvPr id="141" name="Google Shape;141;g324d1e3a553_0_420:notes"/>
           <p:cNvSpPr/>
           <p:nvPr>
             <p:ph idx="2" type="sldImg"/>
@@ -1249,7 +1251,7 @@
       </p:sp>
       <p:sp>
         <p:nvSpPr>
-          <p:cNvPr id="141" name="Google Shape;141;g324d1e3a553_0_434:notes"/>
+          <p:cNvPr id="142" name="Google Shape;142;g324d1e3a553_0_420:notes"/>
           <p:cNvSpPr txBox="1"/>
           <p:nvPr>
             <p:ph idx="1" type="body"/>
@@ -1299,7 +1301,7 @@
   <p:cSld>
     <p:spTree>
       <p:nvGrpSpPr>
-        <p:cNvPr id="145" name="Shape 145"/>
+        <p:cNvPr id="147" name="Shape 147"/>
         <p:cNvGrpSpPr/>
         <p:nvPr/>
       </p:nvGrpSpPr>
@@ -1313,7 +1315,7 @@
       </p:grpSpPr>
       <p:sp>
         <p:nvSpPr>
-          <p:cNvPr id="146" name="Google Shape;146;g324d1e3a553_0_439:notes"/>
+          <p:cNvPr id="148" name="Google Shape;148;g324d1e3a553_0_427:notes"/>
           <p:cNvSpPr/>
           <p:nvPr>
             <p:ph idx="2" type="sldImg"/>
@@ -1348,7 +1350,205 @@
       </p:sp>
       <p:sp>
         <p:nvSpPr>
-          <p:cNvPr id="147" name="Google Shape;147;g324d1e3a553_0_439:notes"/>
+          <p:cNvPr id="149" name="Google Shape;149;g324d1e3a553_0_427:notes"/>
+          <p:cNvSpPr txBox="1"/>
+          <p:nvPr>
+            <p:ph idx="1" type="body"/>
+          </p:nvPr>
+        </p:nvSpPr>
+        <p:spPr>
+          <a:xfrm>
+            <a:off x="685800" y="4343400"/>
+            <a:ext cx="5486400" cy="4114800"/>
+          </a:xfrm>
+          <a:prstGeom prst="rect">
+            <a:avLst/>
+          </a:prstGeom>
+        </p:spPr>
+        <p:txBody>
+          <a:bodyPr anchorCtr="0" anchor="t" bIns="91425" lIns="91425" spcFirstLastPara="1" rIns="91425" wrap="square" tIns="91425">
+            <a:noAutofit/>
+          </a:bodyPr>
+          <a:lstStyle/>
+          <a:p>
+            <a:pPr indent="0" lvl="0" marL="0" rtl="0" algn="l">
+              <a:spcBef>
+                <a:spcPts val="0"/>
+              </a:spcBef>
+              <a:spcAft>
+                <a:spcPts val="0"/>
+              </a:spcAft>
+              <a:buNone/>
+            </a:pPr>
+            <a:r>
+              <a:t/>
+            </a:r>
+            <a:endParaRPr/>
+          </a:p>
+        </p:txBody>
+      </p:sp>
+    </p:spTree>
+  </p:cSld>
+  <p:clrMapOvr>
+    <a:masterClrMapping/>
+  </p:clrMapOvr>
+</p:notes>
+</file>
+
+<file path=ppt/notesSlides/notesSlide16.xml><?xml version="1.0" encoding="utf-8"?>
+<p:notes xmlns:a="http://schemas.openxmlformats.org/drawingml/2006/main" xmlns:r="http://schemas.openxmlformats.org/officeDocument/2006/relationships" xmlns:mc="http://schemas.openxmlformats.org/markup-compatibility/2006" xmlns:mv="urn:schemas-microsoft-com:mac:vml" xmlns:p="http://schemas.openxmlformats.org/presentationml/2006/main" xmlns:c="http://schemas.openxmlformats.org/drawingml/2006/chart" xmlns:dgm="http://schemas.openxmlformats.org/drawingml/2006/diagram" xmlns:o="urn:schemas-microsoft-com:office:office" xmlns:v="urn:schemas-microsoft-com:vml" xmlns:pvml="urn:schemas-microsoft-com:office:powerpoint" xmlns:com="http://schemas.openxmlformats.org/drawingml/2006/compatibility" xmlns:p14="http://schemas.microsoft.com/office/powerpoint/2010/main" xmlns:p15="http://schemas.microsoft.com/office/powerpoint/2012/main" xmlns:ahyp="http://schemas.microsoft.com/office/drawing/2018/hyperlinkcolor" showMasterPhAnim="0" showMasterSp="0">
+  <p:cSld>
+    <p:spTree>
+      <p:nvGrpSpPr>
+        <p:cNvPr id="153" name="Shape 153"/>
+        <p:cNvGrpSpPr/>
+        <p:nvPr/>
+      </p:nvGrpSpPr>
+      <p:grpSpPr>
+        <a:xfrm>
+          <a:off x="0" y="0"/>
+          <a:ext cx="0" cy="0"/>
+          <a:chOff x="0" y="0"/>
+          <a:chExt cx="0" cy="0"/>
+        </a:xfrm>
+      </p:grpSpPr>
+      <p:sp>
+        <p:nvSpPr>
+          <p:cNvPr id="154" name="Google Shape;154;g324d1e3a553_0_434:notes"/>
+          <p:cNvSpPr/>
+          <p:nvPr>
+            <p:ph idx="2" type="sldImg"/>
+          </p:nvPr>
+        </p:nvSpPr>
+        <p:spPr>
+          <a:xfrm>
+            <a:off x="381300" y="685800"/>
+            <a:ext cx="6096000" cy="3429000"/>
+          </a:xfrm>
+          <a:custGeom>
+            <a:rect b="b" l="l" r="r" t="t"/>
+            <a:pathLst>
+              <a:path extrusionOk="0" h="120000" w="120000">
+                <a:moveTo>
+                  <a:pt x="0" y="0"/>
+                </a:moveTo>
+                <a:lnTo>
+                  <a:pt x="120000" y="0"/>
+                </a:lnTo>
+                <a:lnTo>
+                  <a:pt x="120000" y="120000"/>
+                </a:lnTo>
+                <a:lnTo>
+                  <a:pt x="0" y="120000"/>
+                </a:lnTo>
+                <a:close/>
+              </a:path>
+            </a:pathLst>
+          </a:custGeom>
+        </p:spPr>
+      </p:sp>
+      <p:sp>
+        <p:nvSpPr>
+          <p:cNvPr id="155" name="Google Shape;155;g324d1e3a553_0_434:notes"/>
+          <p:cNvSpPr txBox="1"/>
+          <p:nvPr>
+            <p:ph idx="1" type="body"/>
+          </p:nvPr>
+        </p:nvSpPr>
+        <p:spPr>
+          <a:xfrm>
+            <a:off x="685800" y="4343400"/>
+            <a:ext cx="5486400" cy="4114800"/>
+          </a:xfrm>
+          <a:prstGeom prst="rect">
+            <a:avLst/>
+          </a:prstGeom>
+        </p:spPr>
+        <p:txBody>
+          <a:bodyPr anchorCtr="0" anchor="t" bIns="91425" lIns="91425" spcFirstLastPara="1" rIns="91425" wrap="square" tIns="91425">
+            <a:noAutofit/>
+          </a:bodyPr>
+          <a:lstStyle/>
+          <a:p>
+            <a:pPr indent="0" lvl="0" marL="0" rtl="0" algn="l">
+              <a:spcBef>
+                <a:spcPts val="0"/>
+              </a:spcBef>
+              <a:spcAft>
+                <a:spcPts val="0"/>
+              </a:spcAft>
+              <a:buNone/>
+            </a:pPr>
+            <a:r>
+              <a:t/>
+            </a:r>
+            <a:endParaRPr/>
+          </a:p>
+        </p:txBody>
+      </p:sp>
+    </p:spTree>
+  </p:cSld>
+  <p:clrMapOvr>
+    <a:masterClrMapping/>
+  </p:clrMapOvr>
+</p:notes>
+</file>
+
+<file path=ppt/notesSlides/notesSlide17.xml><?xml version="1.0" encoding="utf-8"?>
+<p:notes xmlns:a="http://schemas.openxmlformats.org/drawingml/2006/main" xmlns:r="http://schemas.openxmlformats.org/officeDocument/2006/relationships" xmlns:mc="http://schemas.openxmlformats.org/markup-compatibility/2006" xmlns:mv="urn:schemas-microsoft-com:mac:vml" xmlns:p="http://schemas.openxmlformats.org/presentationml/2006/main" xmlns:c="http://schemas.openxmlformats.org/drawingml/2006/chart" xmlns:dgm="http://schemas.openxmlformats.org/drawingml/2006/diagram" xmlns:o="urn:schemas-microsoft-com:office:office" xmlns:v="urn:schemas-microsoft-com:vml" xmlns:pvml="urn:schemas-microsoft-com:office:powerpoint" xmlns:com="http://schemas.openxmlformats.org/drawingml/2006/compatibility" xmlns:p14="http://schemas.microsoft.com/office/powerpoint/2010/main" xmlns:p15="http://schemas.microsoft.com/office/powerpoint/2012/main" xmlns:ahyp="http://schemas.microsoft.com/office/drawing/2018/hyperlinkcolor" showMasterPhAnim="0" showMasterSp="0">
+  <p:cSld>
+    <p:spTree>
+      <p:nvGrpSpPr>
+        <p:cNvPr id="159" name="Shape 159"/>
+        <p:cNvGrpSpPr/>
+        <p:nvPr/>
+      </p:nvGrpSpPr>
+      <p:grpSpPr>
+        <a:xfrm>
+          <a:off x="0" y="0"/>
+          <a:ext cx="0" cy="0"/>
+          <a:chOff x="0" y="0"/>
+          <a:chExt cx="0" cy="0"/>
+        </a:xfrm>
+      </p:grpSpPr>
+      <p:sp>
+        <p:nvSpPr>
+          <p:cNvPr id="160" name="Google Shape;160;g324d1e3a553_0_439:notes"/>
+          <p:cNvSpPr/>
+          <p:nvPr>
+            <p:ph idx="2" type="sldImg"/>
+          </p:nvPr>
+        </p:nvSpPr>
+        <p:spPr>
+          <a:xfrm>
+            <a:off x="381300" y="685800"/>
+            <a:ext cx="6096000" cy="3429000"/>
+          </a:xfrm>
+          <a:custGeom>
+            <a:rect b="b" l="l" r="r" t="t"/>
+            <a:pathLst>
+              <a:path extrusionOk="0" h="120000" w="120000">
+                <a:moveTo>
+                  <a:pt x="0" y="0"/>
+                </a:moveTo>
+                <a:lnTo>
+                  <a:pt x="120000" y="0"/>
+                </a:lnTo>
+                <a:lnTo>
+                  <a:pt x="120000" y="120000"/>
+                </a:lnTo>
+                <a:lnTo>
+                  <a:pt x="0" y="120000"/>
+                </a:lnTo>
+                <a:close/>
+              </a:path>
+            </a:pathLst>
+          </a:custGeom>
+        </p:spPr>
+      </p:sp>
+      <p:sp>
+        <p:nvSpPr>
+          <p:cNvPr id="161" name="Google Shape;161;g324d1e3a553_0_439:notes"/>
           <p:cNvSpPr txBox="1"/>
           <p:nvPr>
             <p:ph idx="1" type="body"/>
@@ -2006,7 +2206,7 @@
       </p:grpSpPr>
       <p:sp>
         <p:nvSpPr>
-          <p:cNvPr id="99" name="Google Shape;99;g324d1e3a553_0_392:notes"/>
+          <p:cNvPr id="99" name="Google Shape;99;g325249bb49a_0_18:notes"/>
           <p:cNvSpPr/>
           <p:nvPr>
             <p:ph idx="2" type="sldImg"/>
@@ -2041,7 +2241,7 @@
       </p:sp>
       <p:sp>
         <p:nvSpPr>
-          <p:cNvPr id="100" name="Google Shape;100;g324d1e3a553_0_392:notes"/>
+          <p:cNvPr id="100" name="Google Shape;100;g325249bb49a_0_18:notes"/>
           <p:cNvSpPr txBox="1"/>
           <p:nvPr>
             <p:ph idx="1" type="body"/>
@@ -2105,7 +2305,7 @@
       </p:grpSpPr>
       <p:sp>
         <p:nvSpPr>
-          <p:cNvPr id="106" name="Google Shape;106;g324d1e3a553_0_399:notes"/>
+          <p:cNvPr id="106" name="Google Shape;106;g325249bb49a_0_24:notes"/>
           <p:cNvSpPr/>
           <p:nvPr>
             <p:ph idx="2" type="sldImg"/>
@@ -2140,7 +2340,7 @@
       </p:sp>
       <p:sp>
         <p:nvSpPr>
-          <p:cNvPr id="107" name="Google Shape;107;g324d1e3a553_0_399:notes"/>
+          <p:cNvPr id="107" name="Google Shape;107;g325249bb49a_0_24:notes"/>
           <p:cNvSpPr txBox="1"/>
           <p:nvPr>
             <p:ph idx="1" type="body"/>
@@ -7202,7 +7402,7 @@
                   <a:srgbClr val="E3FEF7"/>
                 </a:solidFill>
               </a:rPr>
-              <a:t>Access Control Policy Languages</a:t>
+              <a:t>XML Access Control Models</a:t>
             </a:r>
             <a:endParaRPr b="1" sz="4000">
               <a:solidFill>
@@ -7302,7 +7502,7 @@
                   <a:srgbClr val="E3FEF7"/>
                 </a:solidFill>
               </a:rPr>
-              <a:t>Custom Policy Specifications</a:t>
+              <a:t>Role-Based Access Control for XML</a:t>
             </a:r>
             <a:endParaRPr b="1" sz="2600">
               <a:solidFill>
@@ -7384,7 +7584,7 @@
                   <a:srgbClr val="E3FEF7"/>
                 </a:solidFill>
               </a:rPr>
-              <a:t>Implementation Approaches</a:t>
+              <a:t>Access Control Policy Languages</a:t>
             </a:r>
             <a:endParaRPr b="1" sz="4000">
               <a:solidFill>
@@ -7484,7 +7684,7 @@
                   <a:srgbClr val="E3FEF7"/>
                 </a:solidFill>
               </a:rPr>
-              <a:t>Enforcement Mechanisms</a:t>
+              <a:t>XACML</a:t>
             </a:r>
             <a:endParaRPr b="1" sz="2600">
               <a:solidFill>
@@ -7566,7 +7766,7 @@
                   <a:srgbClr val="E3FEF7"/>
                 </a:solidFill>
               </a:rPr>
-              <a:t>Implementation Approaches</a:t>
+              <a:t>Access Control Policy Languages</a:t>
             </a:r>
             <a:endParaRPr b="1" sz="4000">
               <a:solidFill>
@@ -7666,7 +7866,7 @@
                   <a:srgbClr val="E3FEF7"/>
                 </a:solidFill>
               </a:rPr>
-              <a:t>Performance Considerations</a:t>
+              <a:t>Custom Policy Specifications</a:t>
             </a:r>
             <a:endParaRPr b="1" sz="2600">
               <a:solidFill>
@@ -7748,7 +7948,7 @@
                   <a:srgbClr val="E3FEF7"/>
                 </a:solidFill>
               </a:rPr>
-              <a:t>Case Studies</a:t>
+              <a:t>Implementation Approaches</a:t>
             </a:r>
             <a:endParaRPr b="1" sz="4000">
               <a:solidFill>
@@ -7808,6 +8008,56 @@
           </a:p>
         </p:txBody>
       </p:sp>
+      <p:sp>
+        <p:nvSpPr>
+          <p:cNvPr id="139" name="Google Shape;139;p25"/>
+          <p:cNvSpPr txBox="1"/>
+          <p:nvPr/>
+        </p:nvSpPr>
+        <p:spPr>
+          <a:xfrm>
+            <a:off x="0" y="1061700"/>
+            <a:ext cx="9144000" cy="495600"/>
+          </a:xfrm>
+          <a:prstGeom prst="rect">
+            <a:avLst/>
+          </a:prstGeom>
+          <a:noFill/>
+          <a:ln>
+            <a:noFill/>
+          </a:ln>
+        </p:spPr>
+        <p:txBody>
+          <a:bodyPr anchorCtr="0" anchor="ctr" bIns="91425" lIns="91425" spcFirstLastPara="1" rIns="91425" wrap="square" tIns="91425">
+            <a:noAutofit/>
+          </a:bodyPr>
+          <a:lstStyle/>
+          <a:p>
+            <a:pPr indent="0" lvl="0" marL="0" rtl="0" algn="ctr">
+              <a:spcBef>
+                <a:spcPts val="0"/>
+              </a:spcBef>
+              <a:spcAft>
+                <a:spcPts val="0"/>
+              </a:spcAft>
+              <a:buNone/>
+            </a:pPr>
+            <a:r>
+              <a:rPr b="1" lang="en" sz="2600">
+                <a:solidFill>
+                  <a:srgbClr val="E3FEF7"/>
+                </a:solidFill>
+              </a:rPr>
+              <a:t>Enforcement Mechanisms</a:t>
+            </a:r>
+            <a:endParaRPr b="1" sz="2600">
+              <a:solidFill>
+                <a:srgbClr val="E3FEF7"/>
+              </a:solidFill>
+            </a:endParaRPr>
+          </a:p>
+        </p:txBody>
+      </p:sp>
     </p:spTree>
   </p:cSld>
   <p:clrMapOvr>
@@ -7828,7 +8078,7 @@
     </p:bg>
     <p:spTree>
       <p:nvGrpSpPr>
-        <p:cNvPr id="142" name="Shape 142"/>
+        <p:cNvPr id="143" name="Shape 143"/>
         <p:cNvGrpSpPr/>
         <p:nvPr/>
       </p:nvGrpSpPr>
@@ -7842,7 +8092,7 @@
       </p:grpSpPr>
       <p:sp>
         <p:nvSpPr>
-          <p:cNvPr id="143" name="Google Shape;143;p26"/>
+          <p:cNvPr id="144" name="Google Shape;144;p26"/>
           <p:cNvSpPr txBox="1"/>
           <p:nvPr/>
         </p:nvSpPr>
@@ -7880,7 +8130,7 @@
                   <a:srgbClr val="E3FEF7"/>
                 </a:solidFill>
               </a:rPr>
-              <a:t>Conclusions</a:t>
+              <a:t>Implementation Approaches</a:t>
             </a:r>
             <a:endParaRPr b="1" sz="4000">
               <a:solidFill>
@@ -7892,7 +8142,7 @@
       </p:sp>
       <p:sp>
         <p:nvSpPr>
-          <p:cNvPr id="144" name="Google Shape;144;p26"/>
+          <p:cNvPr id="145" name="Google Shape;145;p26"/>
           <p:cNvSpPr txBox="1"/>
           <p:nvPr/>
         </p:nvSpPr>
@@ -7933,6 +8183,56 @@
               <a:t>Write here.</a:t>
             </a:r>
             <a:endParaRPr i="1" sz="1800">
+              <a:solidFill>
+                <a:srgbClr val="E3FEF7"/>
+              </a:solidFill>
+            </a:endParaRPr>
+          </a:p>
+        </p:txBody>
+      </p:sp>
+      <p:sp>
+        <p:nvSpPr>
+          <p:cNvPr id="146" name="Google Shape;146;p26"/>
+          <p:cNvSpPr txBox="1"/>
+          <p:nvPr/>
+        </p:nvSpPr>
+        <p:spPr>
+          <a:xfrm>
+            <a:off x="0" y="1061700"/>
+            <a:ext cx="9144000" cy="495600"/>
+          </a:xfrm>
+          <a:prstGeom prst="rect">
+            <a:avLst/>
+          </a:prstGeom>
+          <a:noFill/>
+          <a:ln>
+            <a:noFill/>
+          </a:ln>
+        </p:spPr>
+        <p:txBody>
+          <a:bodyPr anchorCtr="0" anchor="ctr" bIns="91425" lIns="91425" spcFirstLastPara="1" rIns="91425" wrap="square" tIns="91425">
+            <a:noAutofit/>
+          </a:bodyPr>
+          <a:lstStyle/>
+          <a:p>
+            <a:pPr indent="0" lvl="0" marL="0" rtl="0" algn="ctr">
+              <a:spcBef>
+                <a:spcPts val="0"/>
+              </a:spcBef>
+              <a:spcAft>
+                <a:spcPts val="0"/>
+              </a:spcAft>
+              <a:buNone/>
+            </a:pPr>
+            <a:r>
+              <a:rPr b="1" lang="en" sz="2600">
+                <a:solidFill>
+                  <a:srgbClr val="E3FEF7"/>
+                </a:solidFill>
+              </a:rPr>
+              <a:t>Performance Considerations</a:t>
+            </a:r>
+            <a:endParaRPr b="1" sz="2600">
               <a:solidFill>
                 <a:srgbClr val="E3FEF7"/>
               </a:solidFill>
@@ -7960,7 +8260,7 @@
     </p:bg>
     <p:spTree>
       <p:nvGrpSpPr>
-        <p:cNvPr id="148" name="Shape 148"/>
+        <p:cNvPr id="150" name="Shape 150"/>
         <p:cNvGrpSpPr/>
         <p:nvPr/>
       </p:nvGrpSpPr>
@@ -7974,7 +8274,7 @@
       </p:grpSpPr>
       <p:sp>
         <p:nvSpPr>
-          <p:cNvPr id="149" name="Google Shape;149;p27"/>
+          <p:cNvPr id="151" name="Google Shape;151;p27"/>
           <p:cNvSpPr txBox="1"/>
           <p:nvPr/>
         </p:nvSpPr>
@@ -8012,7 +8312,7 @@
                   <a:srgbClr val="E3FEF7"/>
                 </a:solidFill>
               </a:rPr>
-              <a:t>References</a:t>
+              <a:t>Case Studies</a:t>
             </a:r>
             <a:endParaRPr b="1" sz="4000">
               <a:solidFill>
@@ -8024,7 +8324,271 @@
       </p:sp>
       <p:sp>
         <p:nvSpPr>
-          <p:cNvPr id="150" name="Google Shape;150;p27"/>
+          <p:cNvPr id="152" name="Google Shape;152;p27"/>
+          <p:cNvSpPr txBox="1"/>
+          <p:nvPr/>
+        </p:nvSpPr>
+        <p:spPr>
+          <a:xfrm>
+            <a:off x="479750" y="1793125"/>
+            <a:ext cx="8234400" cy="2917800"/>
+          </a:xfrm>
+          <a:prstGeom prst="rect">
+            <a:avLst/>
+          </a:prstGeom>
+          <a:noFill/>
+          <a:ln>
+            <a:noFill/>
+          </a:ln>
+        </p:spPr>
+        <p:txBody>
+          <a:bodyPr anchorCtr="0" anchor="ctr" bIns="91425" lIns="91425" spcFirstLastPara="1" rIns="91425" wrap="square" tIns="91425">
+            <a:noAutofit/>
+          </a:bodyPr>
+          <a:lstStyle/>
+          <a:p>
+            <a:pPr indent="0" lvl="0" marL="0" rtl="0" algn="ctr">
+              <a:spcBef>
+                <a:spcPts val="0"/>
+              </a:spcBef>
+              <a:spcAft>
+                <a:spcPts val="0"/>
+              </a:spcAft>
+              <a:buNone/>
+            </a:pPr>
+            <a:r>
+              <a:rPr lang="en" sz="1800">
+                <a:solidFill>
+                  <a:srgbClr val="E3FEF7"/>
+                </a:solidFill>
+              </a:rPr>
+              <a:t>Write here.</a:t>
+            </a:r>
+            <a:endParaRPr i="1" sz="1800">
+              <a:solidFill>
+                <a:srgbClr val="E3FEF7"/>
+              </a:solidFill>
+            </a:endParaRPr>
+          </a:p>
+        </p:txBody>
+      </p:sp>
+    </p:spTree>
+  </p:cSld>
+  <p:clrMapOvr>
+    <a:masterClrMapping/>
+  </p:clrMapOvr>
+</p:sld>
+</file>
+
+<file path=ppt/slides/slide16.xml><?xml version="1.0" encoding="utf-8"?>
+<p:sld xmlns:a="http://schemas.openxmlformats.org/drawingml/2006/main" xmlns:r="http://schemas.openxmlformats.org/officeDocument/2006/relationships" xmlns:mc="http://schemas.openxmlformats.org/markup-compatibility/2006" xmlns:mv="urn:schemas-microsoft-com:mac:vml" xmlns:p="http://schemas.openxmlformats.org/presentationml/2006/main" xmlns:c="http://schemas.openxmlformats.org/drawingml/2006/chart" xmlns:dgm="http://schemas.openxmlformats.org/drawingml/2006/diagram" xmlns:o="urn:schemas-microsoft-com:office:office" xmlns:v="urn:schemas-microsoft-com:vml" xmlns:pvml="urn:schemas-microsoft-com:office:powerpoint" xmlns:com="http://schemas.openxmlformats.org/drawingml/2006/compatibility" xmlns:p14="http://schemas.microsoft.com/office/powerpoint/2010/main" xmlns:p15="http://schemas.microsoft.com/office/powerpoint/2012/main" xmlns:ahyp="http://schemas.microsoft.com/office/drawing/2018/hyperlinkcolor">
+  <p:cSld>
+    <p:bg>
+      <p:bgPr>
+        <a:solidFill>
+          <a:srgbClr val="003C43"/>
+        </a:solidFill>
+      </p:bgPr>
+    </p:bg>
+    <p:spTree>
+      <p:nvGrpSpPr>
+        <p:cNvPr id="156" name="Shape 156"/>
+        <p:cNvGrpSpPr/>
+        <p:nvPr/>
+      </p:nvGrpSpPr>
+      <p:grpSpPr>
+        <a:xfrm>
+          <a:off x="0" y="0"/>
+          <a:ext cx="0" cy="0"/>
+          <a:chOff x="0" y="0"/>
+          <a:chExt cx="0" cy="0"/>
+        </a:xfrm>
+      </p:grpSpPr>
+      <p:sp>
+        <p:nvSpPr>
+          <p:cNvPr id="157" name="Google Shape;157;p28"/>
+          <p:cNvSpPr txBox="1"/>
+          <p:nvPr/>
+        </p:nvSpPr>
+        <p:spPr>
+          <a:xfrm>
+            <a:off x="0" y="180900"/>
+            <a:ext cx="9144000" cy="880800"/>
+          </a:xfrm>
+          <a:prstGeom prst="rect">
+            <a:avLst/>
+          </a:prstGeom>
+          <a:noFill/>
+          <a:ln>
+            <a:noFill/>
+          </a:ln>
+        </p:spPr>
+        <p:txBody>
+          <a:bodyPr anchorCtr="0" anchor="ctr" bIns="91425" lIns="91425" spcFirstLastPara="1" rIns="91425" wrap="square" tIns="91425">
+            <a:noAutofit/>
+          </a:bodyPr>
+          <a:lstStyle/>
+          <a:p>
+            <a:pPr indent="0" lvl="0" marL="0" rtl="0" algn="ctr">
+              <a:spcBef>
+                <a:spcPts val="0"/>
+              </a:spcBef>
+              <a:spcAft>
+                <a:spcPts val="0"/>
+              </a:spcAft>
+              <a:buNone/>
+            </a:pPr>
+            <a:r>
+              <a:rPr b="1" lang="en" sz="4000">
+                <a:solidFill>
+                  <a:srgbClr val="E3FEF7"/>
+                </a:solidFill>
+              </a:rPr>
+              <a:t>Conclusions</a:t>
+            </a:r>
+            <a:endParaRPr b="1" sz="4000">
+              <a:solidFill>
+                <a:srgbClr val="E3FEF7"/>
+              </a:solidFill>
+            </a:endParaRPr>
+          </a:p>
+        </p:txBody>
+      </p:sp>
+      <p:sp>
+        <p:nvSpPr>
+          <p:cNvPr id="158" name="Google Shape;158;p28"/>
+          <p:cNvSpPr txBox="1"/>
+          <p:nvPr/>
+        </p:nvSpPr>
+        <p:spPr>
+          <a:xfrm>
+            <a:off x="479750" y="1793125"/>
+            <a:ext cx="8234400" cy="2917800"/>
+          </a:xfrm>
+          <a:prstGeom prst="rect">
+            <a:avLst/>
+          </a:prstGeom>
+          <a:noFill/>
+          <a:ln>
+            <a:noFill/>
+          </a:ln>
+        </p:spPr>
+        <p:txBody>
+          <a:bodyPr anchorCtr="0" anchor="ctr" bIns="91425" lIns="91425" spcFirstLastPara="1" rIns="91425" wrap="square" tIns="91425">
+            <a:noAutofit/>
+          </a:bodyPr>
+          <a:lstStyle/>
+          <a:p>
+            <a:pPr indent="0" lvl="0" marL="0" rtl="0" algn="ctr">
+              <a:spcBef>
+                <a:spcPts val="0"/>
+              </a:spcBef>
+              <a:spcAft>
+                <a:spcPts val="0"/>
+              </a:spcAft>
+              <a:buNone/>
+            </a:pPr>
+            <a:r>
+              <a:rPr lang="en" sz="1800">
+                <a:solidFill>
+                  <a:srgbClr val="E3FEF7"/>
+                </a:solidFill>
+              </a:rPr>
+              <a:t>Write here.</a:t>
+            </a:r>
+            <a:endParaRPr i="1" sz="1800">
+              <a:solidFill>
+                <a:srgbClr val="E3FEF7"/>
+              </a:solidFill>
+            </a:endParaRPr>
+          </a:p>
+        </p:txBody>
+      </p:sp>
+    </p:spTree>
+  </p:cSld>
+  <p:clrMapOvr>
+    <a:masterClrMapping/>
+  </p:clrMapOvr>
+</p:sld>
+</file>
+
+<file path=ppt/slides/slide17.xml><?xml version="1.0" encoding="utf-8"?>
+<p:sld xmlns:a="http://schemas.openxmlformats.org/drawingml/2006/main" xmlns:r="http://schemas.openxmlformats.org/officeDocument/2006/relationships" xmlns:mc="http://schemas.openxmlformats.org/markup-compatibility/2006" xmlns:mv="urn:schemas-microsoft-com:mac:vml" xmlns:p="http://schemas.openxmlformats.org/presentationml/2006/main" xmlns:c="http://schemas.openxmlformats.org/drawingml/2006/chart" xmlns:dgm="http://schemas.openxmlformats.org/drawingml/2006/diagram" xmlns:o="urn:schemas-microsoft-com:office:office" xmlns:v="urn:schemas-microsoft-com:vml" xmlns:pvml="urn:schemas-microsoft-com:office:powerpoint" xmlns:com="http://schemas.openxmlformats.org/drawingml/2006/compatibility" xmlns:p14="http://schemas.microsoft.com/office/powerpoint/2010/main" xmlns:p15="http://schemas.microsoft.com/office/powerpoint/2012/main" xmlns:ahyp="http://schemas.microsoft.com/office/drawing/2018/hyperlinkcolor">
+  <p:cSld>
+    <p:bg>
+      <p:bgPr>
+        <a:solidFill>
+          <a:srgbClr val="003C43"/>
+        </a:solidFill>
+      </p:bgPr>
+    </p:bg>
+    <p:spTree>
+      <p:nvGrpSpPr>
+        <p:cNvPr id="162" name="Shape 162"/>
+        <p:cNvGrpSpPr/>
+        <p:nvPr/>
+      </p:nvGrpSpPr>
+      <p:grpSpPr>
+        <a:xfrm>
+          <a:off x="0" y="0"/>
+          <a:ext cx="0" cy="0"/>
+          <a:chOff x="0" y="0"/>
+          <a:chExt cx="0" cy="0"/>
+        </a:xfrm>
+      </p:grpSpPr>
+      <p:sp>
+        <p:nvSpPr>
+          <p:cNvPr id="163" name="Google Shape;163;p29"/>
+          <p:cNvSpPr txBox="1"/>
+          <p:nvPr/>
+        </p:nvSpPr>
+        <p:spPr>
+          <a:xfrm>
+            <a:off x="0" y="180900"/>
+            <a:ext cx="9144000" cy="880800"/>
+          </a:xfrm>
+          <a:prstGeom prst="rect">
+            <a:avLst/>
+          </a:prstGeom>
+          <a:noFill/>
+          <a:ln>
+            <a:noFill/>
+          </a:ln>
+        </p:spPr>
+        <p:txBody>
+          <a:bodyPr anchorCtr="0" anchor="ctr" bIns="91425" lIns="91425" spcFirstLastPara="1" rIns="91425" wrap="square" tIns="91425">
+            <a:noAutofit/>
+          </a:bodyPr>
+          <a:lstStyle/>
+          <a:p>
+            <a:pPr indent="0" lvl="0" marL="0" rtl="0" algn="ctr">
+              <a:spcBef>
+                <a:spcPts val="0"/>
+              </a:spcBef>
+              <a:spcAft>
+                <a:spcPts val="0"/>
+              </a:spcAft>
+              <a:buNone/>
+            </a:pPr>
+            <a:r>
+              <a:rPr b="1" lang="en" sz="4000">
+                <a:solidFill>
+                  <a:srgbClr val="E3FEF7"/>
+                </a:solidFill>
+              </a:rPr>
+              <a:t>References</a:t>
+            </a:r>
+            <a:endParaRPr b="1" sz="4000">
+              <a:solidFill>
+                <a:srgbClr val="E3FEF7"/>
+              </a:solidFill>
+            </a:endParaRPr>
+          </a:p>
+        </p:txBody>
+      </p:sp>
+      <p:sp>
+        <p:nvSpPr>
+          <p:cNvPr id="164" name="Google Shape;164;p29"/>
           <p:cNvSpPr txBox="1"/>
           <p:nvPr/>
         </p:nvSpPr>
@@ -10020,7 +10584,7 @@
                   <a:srgbClr val="E3FEF7"/>
                 </a:solidFill>
               </a:rPr>
-              <a:t>XML Access Control Models</a:t>
+              <a:t>Modele de Control al Accesului XML</a:t>
             </a:r>
             <a:endParaRPr b="1" sz="4000">
               <a:solidFill>
@@ -10033,56 +10597,6 @@
       <p:sp>
         <p:nvSpPr>
           <p:cNvPr id="96" name="Google Shape;96;p19"/>
-          <p:cNvSpPr txBox="1"/>
-          <p:nvPr/>
-        </p:nvSpPr>
-        <p:spPr>
-          <a:xfrm>
-            <a:off x="479750" y="1793125"/>
-            <a:ext cx="8234400" cy="2917800"/>
-          </a:xfrm>
-          <a:prstGeom prst="rect">
-            <a:avLst/>
-          </a:prstGeom>
-          <a:noFill/>
-          <a:ln>
-            <a:noFill/>
-          </a:ln>
-        </p:spPr>
-        <p:txBody>
-          <a:bodyPr anchorCtr="0" anchor="ctr" bIns="91425" lIns="91425" spcFirstLastPara="1" rIns="91425" wrap="square" tIns="91425">
-            <a:noAutofit/>
-          </a:bodyPr>
-          <a:lstStyle/>
-          <a:p>
-            <a:pPr indent="0" lvl="0" marL="0" rtl="0" algn="ctr">
-              <a:spcBef>
-                <a:spcPts val="0"/>
-              </a:spcBef>
-              <a:spcAft>
-                <a:spcPts val="0"/>
-              </a:spcAft>
-              <a:buNone/>
-            </a:pPr>
-            <a:r>
-              <a:rPr lang="en" sz="1800">
-                <a:solidFill>
-                  <a:srgbClr val="E3FEF7"/>
-                </a:solidFill>
-              </a:rPr>
-              <a:t>Write here.</a:t>
-            </a:r>
-            <a:endParaRPr i="1" sz="1800">
-              <a:solidFill>
-                <a:srgbClr val="E3FEF7"/>
-              </a:solidFill>
-            </a:endParaRPr>
-          </a:p>
-        </p:txBody>
-      </p:sp>
-      <p:sp>
-        <p:nvSpPr>
-          <p:cNvPr id="97" name="Google Shape;97;p19"/>
           <p:cNvSpPr txBox="1"/>
           <p:nvPr/>
         </p:nvSpPr>
@@ -10120,9 +10634,190 @@
                   <a:srgbClr val="E3FEF7"/>
                 </a:solidFill>
               </a:rPr>
-              <a:t>Fine-Grained Access Control</a:t>
+              <a:t>Control al Accesului Fin</a:t>
             </a:r>
             <a:endParaRPr b="1" sz="2600">
+              <a:solidFill>
+                <a:srgbClr val="E3FEF7"/>
+              </a:solidFill>
+            </a:endParaRPr>
+          </a:p>
+        </p:txBody>
+      </p:sp>
+      <p:sp>
+        <p:nvSpPr>
+          <p:cNvPr id="97" name="Google Shape;97;p19"/>
+          <p:cNvSpPr txBox="1"/>
+          <p:nvPr/>
+        </p:nvSpPr>
+        <p:spPr>
+          <a:xfrm>
+            <a:off x="454800" y="1557300"/>
+            <a:ext cx="8234400" cy="3303000"/>
+          </a:xfrm>
+          <a:prstGeom prst="rect">
+            <a:avLst/>
+          </a:prstGeom>
+          <a:noFill/>
+          <a:ln>
+            <a:noFill/>
+          </a:ln>
+        </p:spPr>
+        <p:txBody>
+          <a:bodyPr anchorCtr="0" anchor="t" bIns="91425" lIns="91425" spcFirstLastPara="1" rIns="91425" wrap="square" tIns="91425">
+            <a:noAutofit/>
+          </a:bodyPr>
+          <a:lstStyle/>
+          <a:p>
+            <a:pPr indent="-342900" lvl="0" marL="457200" rtl="0" algn="l">
+              <a:lnSpc>
+                <a:spcPct val="130000"/>
+              </a:lnSpc>
+              <a:spcBef>
+                <a:spcPts val="0"/>
+              </a:spcBef>
+              <a:spcAft>
+                <a:spcPts val="0"/>
+              </a:spcAft>
+              <a:buClr>
+                <a:srgbClr val="E3FEF7"/>
+              </a:buClr>
+              <a:buSzPts val="1800"/>
+              <a:buChar char="●"/>
+            </a:pPr>
+            <a:r>
+              <a:rPr b="1" lang="en" sz="1800">
+                <a:solidFill>
+                  <a:srgbClr val="E3FEF7"/>
+                </a:solidFill>
+              </a:rPr>
+              <a:t>Definiție:</a:t>
+            </a:r>
+            <a:endParaRPr b="1" sz="1800">
+              <a:solidFill>
+                <a:srgbClr val="E3FEF7"/>
+              </a:solidFill>
+            </a:endParaRPr>
+          </a:p>
+          <a:p>
+            <a:pPr indent="-342900" lvl="1" marL="914400" rtl="0" algn="l">
+              <a:lnSpc>
+                <a:spcPct val="130000"/>
+              </a:lnSpc>
+              <a:spcBef>
+                <a:spcPts val="0"/>
+              </a:spcBef>
+              <a:spcAft>
+                <a:spcPts val="0"/>
+              </a:spcAft>
+              <a:buClr>
+                <a:srgbClr val="E3FEF7"/>
+              </a:buClr>
+              <a:buSzPts val="1800"/>
+              <a:buChar char="○"/>
+            </a:pPr>
+            <a:r>
+              <a:rPr b="1" lang="en" sz="1800">
+                <a:solidFill>
+                  <a:srgbClr val="E3FEF7"/>
+                </a:solidFill>
+              </a:rPr>
+              <a:t>Permite definirea politicilor de acces detaliate la nivel de elemente, atribute sau valori XML.</a:t>
+            </a:r>
+            <a:endParaRPr b="1" sz="1800">
+              <a:solidFill>
+                <a:srgbClr val="E3FEF7"/>
+              </a:solidFill>
+            </a:endParaRPr>
+          </a:p>
+          <a:p>
+            <a:pPr indent="-342900" lvl="0" marL="457200" rtl="0" algn="l">
+              <a:lnSpc>
+                <a:spcPct val="130000"/>
+              </a:lnSpc>
+              <a:spcBef>
+                <a:spcPts val="0"/>
+              </a:spcBef>
+              <a:spcAft>
+                <a:spcPts val="0"/>
+              </a:spcAft>
+              <a:buClr>
+                <a:srgbClr val="E3FEF7"/>
+              </a:buClr>
+              <a:buSzPts val="1800"/>
+              <a:buChar char="●"/>
+            </a:pPr>
+            <a:r>
+              <a:rPr b="1" lang="en" sz="1800">
+                <a:solidFill>
+                  <a:srgbClr val="E3FEF7"/>
+                </a:solidFill>
+              </a:rPr>
+              <a:t>Provocări:</a:t>
+            </a:r>
+            <a:endParaRPr b="1" sz="1800">
+              <a:solidFill>
+                <a:srgbClr val="E3FEF7"/>
+              </a:solidFill>
+            </a:endParaRPr>
+          </a:p>
+          <a:p>
+            <a:pPr indent="-342900" lvl="1" marL="914400" rtl="0" algn="l">
+              <a:lnSpc>
+                <a:spcPct val="130000"/>
+              </a:lnSpc>
+              <a:spcBef>
+                <a:spcPts val="0"/>
+              </a:spcBef>
+              <a:spcAft>
+                <a:spcPts val="0"/>
+              </a:spcAft>
+              <a:buClr>
+                <a:srgbClr val="E3FEF7"/>
+              </a:buClr>
+              <a:buSzPts val="1800"/>
+              <a:buChar char="○"/>
+            </a:pPr>
+            <a:r>
+              <a:rPr b="1" lang="en" sz="1800">
+                <a:solidFill>
+                  <a:srgbClr val="E3FEF7"/>
+                </a:solidFill>
+              </a:rPr>
+              <a:t>Complexitate ridicată în definirea și gestionarea regulilor.</a:t>
+            </a:r>
+            <a:endParaRPr b="1" sz="1800">
+              <a:solidFill>
+                <a:srgbClr val="E3FEF7"/>
+              </a:solidFill>
+            </a:endParaRPr>
+          </a:p>
+          <a:p>
+            <a:pPr indent="-342900" lvl="1" marL="914400" rtl="0" algn="l">
+              <a:lnSpc>
+                <a:spcPct val="130000"/>
+              </a:lnSpc>
+              <a:spcBef>
+                <a:spcPts val="0"/>
+              </a:spcBef>
+              <a:spcAft>
+                <a:spcPts val="0"/>
+              </a:spcAft>
+              <a:buClr>
+                <a:srgbClr val="E3FEF7"/>
+              </a:buClr>
+              <a:buSzPts val="1800"/>
+              <a:buChar char="○"/>
+            </a:pPr>
+            <a:r>
+              <a:rPr b="1" lang="en" sz="1800">
+                <a:solidFill>
+                  <a:srgbClr val="E3FEF7"/>
+                </a:solidFill>
+              </a:rPr>
+              <a:t>Impact asupra performanței sistemului.</a:t>
+            </a:r>
+            <a:endParaRPr b="1" sz="1800">
               <a:solidFill>
                 <a:srgbClr val="E3FEF7"/>
               </a:solidFill>
@@ -10202,7 +10897,7 @@
                   <a:srgbClr val="E3FEF7"/>
                 </a:solidFill>
               </a:rPr>
-              <a:t>XML Access Control Models</a:t>
+              <a:t>Modele de Control al Accesului XML</a:t>
             </a:r>
             <a:endParaRPr b="1" sz="4000">
               <a:solidFill>
@@ -10215,56 +10910,6 @@
       <p:sp>
         <p:nvSpPr>
           <p:cNvPr id="103" name="Google Shape;103;p20"/>
-          <p:cNvSpPr txBox="1"/>
-          <p:nvPr/>
-        </p:nvSpPr>
-        <p:spPr>
-          <a:xfrm>
-            <a:off x="479750" y="1793125"/>
-            <a:ext cx="8234400" cy="2917800"/>
-          </a:xfrm>
-          <a:prstGeom prst="rect">
-            <a:avLst/>
-          </a:prstGeom>
-          <a:noFill/>
-          <a:ln>
-            <a:noFill/>
-          </a:ln>
-        </p:spPr>
-        <p:txBody>
-          <a:bodyPr anchorCtr="0" anchor="ctr" bIns="91425" lIns="91425" spcFirstLastPara="1" rIns="91425" wrap="square" tIns="91425">
-            <a:noAutofit/>
-          </a:bodyPr>
-          <a:lstStyle/>
-          <a:p>
-            <a:pPr indent="0" lvl="0" marL="0" rtl="0" algn="ctr">
-              <a:spcBef>
-                <a:spcPts val="0"/>
-              </a:spcBef>
-              <a:spcAft>
-                <a:spcPts val="0"/>
-              </a:spcAft>
-              <a:buNone/>
-            </a:pPr>
-            <a:r>
-              <a:rPr lang="en" sz="1800">
-                <a:solidFill>
-                  <a:srgbClr val="E3FEF7"/>
-                </a:solidFill>
-              </a:rPr>
-              <a:t>Write here.</a:t>
-            </a:r>
-            <a:endParaRPr i="1" sz="1800">
-              <a:solidFill>
-                <a:srgbClr val="E3FEF7"/>
-              </a:solidFill>
-            </a:endParaRPr>
-          </a:p>
-        </p:txBody>
-      </p:sp>
-      <p:sp>
-        <p:nvSpPr>
-          <p:cNvPr id="104" name="Google Shape;104;p20"/>
           <p:cNvSpPr txBox="1"/>
           <p:nvPr/>
         </p:nvSpPr>
@@ -10302,9 +10947,252 @@
                   <a:srgbClr val="E3FEF7"/>
                 </a:solidFill>
               </a:rPr>
-              <a:t>Role-Based Access Control for XML</a:t>
+              <a:t>Control al Accesului Fin</a:t>
             </a:r>
             <a:endParaRPr b="1" sz="2600">
+              <a:solidFill>
+                <a:srgbClr val="E3FEF7"/>
+              </a:solidFill>
+            </a:endParaRPr>
+          </a:p>
+        </p:txBody>
+      </p:sp>
+      <p:sp>
+        <p:nvSpPr>
+          <p:cNvPr id="104" name="Google Shape;104;p20"/>
+          <p:cNvSpPr txBox="1"/>
+          <p:nvPr/>
+        </p:nvSpPr>
+        <p:spPr>
+          <a:xfrm>
+            <a:off x="454800" y="1557300"/>
+            <a:ext cx="8234400" cy="3303000"/>
+          </a:xfrm>
+          <a:prstGeom prst="rect">
+            <a:avLst/>
+          </a:prstGeom>
+          <a:noFill/>
+          <a:ln>
+            <a:noFill/>
+          </a:ln>
+        </p:spPr>
+        <p:txBody>
+          <a:bodyPr anchorCtr="0" anchor="t" bIns="91425" lIns="91425" spcFirstLastPara="1" rIns="91425" wrap="square" tIns="91425">
+            <a:noAutofit/>
+          </a:bodyPr>
+          <a:lstStyle/>
+          <a:p>
+            <a:pPr indent="-342900" lvl="0" marL="457200" rtl="0" algn="l">
+              <a:lnSpc>
+                <a:spcPct val="130000"/>
+              </a:lnSpc>
+              <a:spcBef>
+                <a:spcPts val="0"/>
+              </a:spcBef>
+              <a:spcAft>
+                <a:spcPts val="0"/>
+              </a:spcAft>
+              <a:buClr>
+                <a:srgbClr val="E3FEF7"/>
+              </a:buClr>
+              <a:buSzPts val="1800"/>
+              <a:buChar char="●"/>
+            </a:pPr>
+            <a:r>
+              <a:rPr b="1" lang="en" sz="1800">
+                <a:solidFill>
+                  <a:srgbClr val="E3FEF7"/>
+                </a:solidFill>
+              </a:rPr>
+              <a:t>Caracteristici principale:</a:t>
+            </a:r>
+            <a:endParaRPr b="1" sz="1800">
+              <a:solidFill>
+                <a:srgbClr val="E3FEF7"/>
+              </a:solidFill>
+            </a:endParaRPr>
+          </a:p>
+          <a:p>
+            <a:pPr indent="-342900" lvl="1" marL="914400" rtl="0" algn="l">
+              <a:lnSpc>
+                <a:spcPct val="130000"/>
+              </a:lnSpc>
+              <a:spcBef>
+                <a:spcPts val="0"/>
+              </a:spcBef>
+              <a:spcAft>
+                <a:spcPts val="0"/>
+              </a:spcAft>
+              <a:buClr>
+                <a:srgbClr val="E3FEF7"/>
+              </a:buClr>
+              <a:buSzPts val="1800"/>
+              <a:buChar char="○"/>
+            </a:pPr>
+            <a:r>
+              <a:rPr b="1" lang="en" sz="1800">
+                <a:solidFill>
+                  <a:srgbClr val="E3FEF7"/>
+                </a:solidFill>
+              </a:rPr>
+              <a:t>Flexibilitate:</a:t>
+            </a:r>
+            <a:endParaRPr b="1" sz="1800">
+              <a:solidFill>
+                <a:srgbClr val="E3FEF7"/>
+              </a:solidFill>
+            </a:endParaRPr>
+          </a:p>
+          <a:p>
+            <a:pPr indent="-342900" lvl="2" marL="1371600" rtl="0" algn="l">
+              <a:lnSpc>
+                <a:spcPct val="130000"/>
+              </a:lnSpc>
+              <a:spcBef>
+                <a:spcPts val="0"/>
+              </a:spcBef>
+              <a:spcAft>
+                <a:spcPts val="0"/>
+              </a:spcAft>
+              <a:buClr>
+                <a:srgbClr val="E3FEF7"/>
+              </a:buClr>
+              <a:buSzPts val="1800"/>
+              <a:buChar char="■"/>
+            </a:pPr>
+            <a:r>
+              <a:rPr b="1" lang="en" sz="1800">
+                <a:solidFill>
+                  <a:srgbClr val="E3FEF7"/>
+                </a:solidFill>
+              </a:rPr>
+              <a:t>Reguli diferite pentru părți diferite ale documentului.</a:t>
+            </a:r>
+            <a:endParaRPr b="1" sz="1800">
+              <a:solidFill>
+                <a:srgbClr val="E3FEF7"/>
+              </a:solidFill>
+            </a:endParaRPr>
+          </a:p>
+          <a:p>
+            <a:pPr indent="-342900" lvl="1" marL="914400" rtl="0" algn="l">
+              <a:lnSpc>
+                <a:spcPct val="130000"/>
+              </a:lnSpc>
+              <a:spcBef>
+                <a:spcPts val="0"/>
+              </a:spcBef>
+              <a:spcAft>
+                <a:spcPts val="0"/>
+              </a:spcAft>
+              <a:buClr>
+                <a:srgbClr val="E3FEF7"/>
+              </a:buClr>
+              <a:buSzPts val="1800"/>
+              <a:buChar char="○"/>
+            </a:pPr>
+            <a:r>
+              <a:rPr b="1" lang="en" sz="1800">
+                <a:solidFill>
+                  <a:srgbClr val="E3FEF7"/>
+                </a:solidFill>
+              </a:rPr>
+              <a:t>Protecția datelor sensibile:</a:t>
+            </a:r>
+            <a:endParaRPr b="1" sz="1800">
+              <a:solidFill>
+                <a:srgbClr val="E3FEF7"/>
+              </a:solidFill>
+            </a:endParaRPr>
+          </a:p>
+          <a:p>
+            <a:pPr indent="-342900" lvl="2" marL="1371600" rtl="0" algn="l">
+              <a:lnSpc>
+                <a:spcPct val="130000"/>
+              </a:lnSpc>
+              <a:spcBef>
+                <a:spcPts val="0"/>
+              </a:spcBef>
+              <a:spcAft>
+                <a:spcPts val="0"/>
+              </a:spcAft>
+              <a:buClr>
+                <a:srgbClr val="E3FEF7"/>
+              </a:buClr>
+              <a:buSzPts val="1800"/>
+              <a:buChar char="■"/>
+            </a:pPr>
+            <a:r>
+              <a:rPr b="1" lang="en" sz="1800">
+                <a:solidFill>
+                  <a:srgbClr val="E3FEF7"/>
+                </a:solidFill>
+              </a:rPr>
+              <a:t>Acces personalizat pentru utilizatori autorizați.</a:t>
+            </a:r>
+            <a:endParaRPr b="1" sz="1800">
+              <a:solidFill>
+                <a:srgbClr val="E3FEF7"/>
+              </a:solidFill>
+            </a:endParaRPr>
+          </a:p>
+          <a:p>
+            <a:pPr indent="-342900" lvl="1" marL="914400" rtl="0" algn="l">
+              <a:lnSpc>
+                <a:spcPct val="130000"/>
+              </a:lnSpc>
+              <a:spcBef>
+                <a:spcPts val="0"/>
+              </a:spcBef>
+              <a:spcAft>
+                <a:spcPts val="0"/>
+              </a:spcAft>
+              <a:buClr>
+                <a:srgbClr val="E3FEF7"/>
+              </a:buClr>
+              <a:buSzPts val="1800"/>
+              <a:buChar char="○"/>
+            </a:pPr>
+            <a:r>
+              <a:rPr b="1" lang="en" sz="1800">
+                <a:solidFill>
+                  <a:srgbClr val="E3FEF7"/>
+                </a:solidFill>
+              </a:rPr>
+              <a:t>Aplicații:</a:t>
+            </a:r>
+            <a:endParaRPr b="1" sz="1800">
+              <a:solidFill>
+                <a:srgbClr val="E3FEF7"/>
+              </a:solidFill>
+            </a:endParaRPr>
+          </a:p>
+          <a:p>
+            <a:pPr indent="-342900" lvl="2" marL="1371600" rtl="0" algn="l">
+              <a:lnSpc>
+                <a:spcPct val="130000"/>
+              </a:lnSpc>
+              <a:spcBef>
+                <a:spcPts val="0"/>
+              </a:spcBef>
+              <a:spcAft>
+                <a:spcPts val="0"/>
+              </a:spcAft>
+              <a:buClr>
+                <a:srgbClr val="E3FEF7"/>
+              </a:buClr>
+              <a:buSzPts val="1800"/>
+              <a:buChar char="■"/>
+            </a:pPr>
+            <a:r>
+              <a:rPr b="1" lang="en" sz="1800">
+                <a:solidFill>
+                  <a:srgbClr val="E3FEF7"/>
+                </a:solidFill>
+              </a:rPr>
+              <a:t>Sisteme financiare, guvernamentale, sănătate.</a:t>
+            </a:r>
+            <a:endParaRPr b="1" sz="1800">
               <a:solidFill>
                 <a:srgbClr val="E3FEF7"/>
               </a:solidFill>
@@ -10384,7 +11272,7 @@
                   <a:srgbClr val="E3FEF7"/>
                 </a:solidFill>
               </a:rPr>
-              <a:t>Access Control Policy Languages</a:t>
+              <a:t>Modele de Control al Accesului XML</a:t>
             </a:r>
             <a:endParaRPr b="1" sz="4000">
               <a:solidFill>
@@ -10397,56 +11285,6 @@
       <p:sp>
         <p:nvSpPr>
           <p:cNvPr id="110" name="Google Shape;110;p21"/>
-          <p:cNvSpPr txBox="1"/>
-          <p:nvPr/>
-        </p:nvSpPr>
-        <p:spPr>
-          <a:xfrm>
-            <a:off x="479750" y="1793125"/>
-            <a:ext cx="8234400" cy="2917800"/>
-          </a:xfrm>
-          <a:prstGeom prst="rect">
-            <a:avLst/>
-          </a:prstGeom>
-          <a:noFill/>
-          <a:ln>
-            <a:noFill/>
-          </a:ln>
-        </p:spPr>
-        <p:txBody>
-          <a:bodyPr anchorCtr="0" anchor="ctr" bIns="91425" lIns="91425" spcFirstLastPara="1" rIns="91425" wrap="square" tIns="91425">
-            <a:noAutofit/>
-          </a:bodyPr>
-          <a:lstStyle/>
-          <a:p>
-            <a:pPr indent="0" lvl="0" marL="0" rtl="0" algn="ctr">
-              <a:spcBef>
-                <a:spcPts val="0"/>
-              </a:spcBef>
-              <a:spcAft>
-                <a:spcPts val="0"/>
-              </a:spcAft>
-              <a:buNone/>
-            </a:pPr>
-            <a:r>
-              <a:rPr lang="en" sz="1800">
-                <a:solidFill>
-                  <a:srgbClr val="E3FEF7"/>
-                </a:solidFill>
-              </a:rPr>
-              <a:t>Write here.</a:t>
-            </a:r>
-            <a:endParaRPr i="1" sz="1800">
-              <a:solidFill>
-                <a:srgbClr val="E3FEF7"/>
-              </a:solidFill>
-            </a:endParaRPr>
-          </a:p>
-        </p:txBody>
-      </p:sp>
-      <p:sp>
-        <p:nvSpPr>
-          <p:cNvPr id="111" name="Google Shape;111;p21"/>
           <p:cNvSpPr txBox="1"/>
           <p:nvPr/>
         </p:nvSpPr>
@@ -10484,9 +11322,221 @@
                   <a:srgbClr val="E3FEF7"/>
                 </a:solidFill>
               </a:rPr>
-              <a:t>XACML</a:t>
+              <a:t>Control al Accesului Fin</a:t>
             </a:r>
             <a:endParaRPr b="1" sz="2600">
+              <a:solidFill>
+                <a:srgbClr val="E3FEF7"/>
+              </a:solidFill>
+            </a:endParaRPr>
+          </a:p>
+        </p:txBody>
+      </p:sp>
+      <p:sp>
+        <p:nvSpPr>
+          <p:cNvPr id="111" name="Google Shape;111;p21"/>
+          <p:cNvSpPr txBox="1"/>
+          <p:nvPr/>
+        </p:nvSpPr>
+        <p:spPr>
+          <a:xfrm>
+            <a:off x="454800" y="1557300"/>
+            <a:ext cx="8234400" cy="3303000"/>
+          </a:xfrm>
+          <a:prstGeom prst="rect">
+            <a:avLst/>
+          </a:prstGeom>
+          <a:noFill/>
+          <a:ln>
+            <a:noFill/>
+          </a:ln>
+        </p:spPr>
+        <p:txBody>
+          <a:bodyPr anchorCtr="0" anchor="t" bIns="91425" lIns="91425" spcFirstLastPara="1" rIns="91425" wrap="square" tIns="91425">
+            <a:noAutofit/>
+          </a:bodyPr>
+          <a:lstStyle/>
+          <a:p>
+            <a:pPr indent="-342900" lvl="0" marL="457200" rtl="0" algn="l">
+              <a:lnSpc>
+                <a:spcPct val="130000"/>
+              </a:lnSpc>
+              <a:spcBef>
+                <a:spcPts val="0"/>
+              </a:spcBef>
+              <a:spcAft>
+                <a:spcPts val="0"/>
+              </a:spcAft>
+              <a:buClr>
+                <a:srgbClr val="E3FEF7"/>
+              </a:buClr>
+              <a:buSzPts val="1800"/>
+              <a:buChar char="●"/>
+            </a:pPr>
+            <a:r>
+              <a:rPr b="1" lang="en" sz="1800">
+                <a:solidFill>
+                  <a:srgbClr val="E3FEF7"/>
+                </a:solidFill>
+              </a:rPr>
+              <a:t>Implementare:</a:t>
+            </a:r>
+            <a:endParaRPr b="1" sz="1800">
+              <a:solidFill>
+                <a:srgbClr val="E3FEF7"/>
+              </a:solidFill>
+            </a:endParaRPr>
+          </a:p>
+          <a:p>
+            <a:pPr indent="-342900" lvl="1" marL="914400" rtl="0" algn="l">
+              <a:lnSpc>
+                <a:spcPct val="130000"/>
+              </a:lnSpc>
+              <a:spcBef>
+                <a:spcPts val="0"/>
+              </a:spcBef>
+              <a:spcAft>
+                <a:spcPts val="0"/>
+              </a:spcAft>
+              <a:buClr>
+                <a:srgbClr val="E3FEF7"/>
+              </a:buClr>
+              <a:buSzPts val="1800"/>
+              <a:buChar char="○"/>
+            </a:pPr>
+            <a:r>
+              <a:rPr b="1" lang="en" sz="1800">
+                <a:solidFill>
+                  <a:srgbClr val="E3FEF7"/>
+                </a:solidFill>
+              </a:rPr>
+              <a:t>Utilizarea limbajelor precum XACML pentru definirea politicilor.</a:t>
+            </a:r>
+            <a:endParaRPr b="1" sz="1800">
+              <a:solidFill>
+                <a:srgbClr val="E3FEF7"/>
+              </a:solidFill>
+            </a:endParaRPr>
+          </a:p>
+          <a:p>
+            <a:pPr indent="-342900" lvl="1" marL="914400" rtl="0" algn="l">
+              <a:lnSpc>
+                <a:spcPct val="130000"/>
+              </a:lnSpc>
+              <a:spcBef>
+                <a:spcPts val="0"/>
+              </a:spcBef>
+              <a:spcAft>
+                <a:spcPts val="0"/>
+              </a:spcAft>
+              <a:buClr>
+                <a:srgbClr val="E3FEF7"/>
+              </a:buClr>
+              <a:buSzPts val="1800"/>
+              <a:buChar char="○"/>
+            </a:pPr>
+            <a:r>
+              <a:rPr b="1" lang="en" sz="1800">
+                <a:solidFill>
+                  <a:srgbClr val="E3FEF7"/>
+                </a:solidFill>
+              </a:rPr>
+              <a:t>Exemplu:</a:t>
+            </a:r>
+            <a:endParaRPr b="1" sz="1800">
+              <a:solidFill>
+                <a:srgbClr val="E3FEF7"/>
+              </a:solidFill>
+            </a:endParaRPr>
+          </a:p>
+          <a:p>
+            <a:pPr indent="-342900" lvl="2" marL="1371600" rtl="0" algn="l">
+              <a:lnSpc>
+                <a:spcPct val="130000"/>
+              </a:lnSpc>
+              <a:spcBef>
+                <a:spcPts val="0"/>
+              </a:spcBef>
+              <a:spcAft>
+                <a:spcPts val="0"/>
+              </a:spcAft>
+              <a:buClr>
+                <a:srgbClr val="E3FEF7"/>
+              </a:buClr>
+              <a:buSzPts val="1800"/>
+              <a:buChar char="■"/>
+            </a:pPr>
+            <a:r>
+              <a:rPr b="1" lang="en" sz="1800">
+                <a:solidFill>
+                  <a:srgbClr val="E3FEF7"/>
+                </a:solidFill>
+              </a:rPr>
+              <a:t>Protecție pe elemente precum:</a:t>
+            </a:r>
+            <a:endParaRPr b="1" sz="1800">
+              <a:solidFill>
+                <a:srgbClr val="E3FEF7"/>
+              </a:solidFill>
+            </a:endParaRPr>
+          </a:p>
+          <a:p>
+            <a:pPr indent="-342900" lvl="3" marL="1828800" rtl="0" algn="l">
+              <a:lnSpc>
+                <a:spcPct val="130000"/>
+              </a:lnSpc>
+              <a:spcBef>
+                <a:spcPts val="0"/>
+              </a:spcBef>
+              <a:spcAft>
+                <a:spcPts val="0"/>
+              </a:spcAft>
+              <a:buClr>
+                <a:srgbClr val="E3FEF7"/>
+              </a:buClr>
+              <a:buSzPts val="1800"/>
+              <a:buChar char="●"/>
+            </a:pPr>
+            <a:r>
+              <a:rPr b="1" lang="en" sz="1800">
+                <a:solidFill>
+                  <a:srgbClr val="E3FEF7"/>
+                </a:solidFill>
+              </a:rPr>
+              <a:t>&lt;Pacient&gt;</a:t>
+            </a:r>
+            <a:endParaRPr b="1" sz="1800">
+              <a:solidFill>
+                <a:srgbClr val="E3FEF7"/>
+              </a:solidFill>
+            </a:endParaRPr>
+          </a:p>
+          <a:p>
+            <a:pPr indent="-342900" lvl="3" marL="1828800" rtl="0" algn="l">
+              <a:lnSpc>
+                <a:spcPct val="130000"/>
+              </a:lnSpc>
+              <a:spcBef>
+                <a:spcPts val="0"/>
+              </a:spcBef>
+              <a:spcAft>
+                <a:spcPts val="0"/>
+              </a:spcAft>
+              <a:buClr>
+                <a:srgbClr val="E3FEF7"/>
+              </a:buClr>
+              <a:buSzPts val="1800"/>
+              <a:buChar char="●"/>
+            </a:pPr>
+            <a:r>
+              <a:rPr b="1" lang="en" sz="1800">
+                <a:solidFill>
+                  <a:srgbClr val="E3FEF7"/>
+                </a:solidFill>
+              </a:rPr>
+              <a:t>&lt;Salariu&gt;</a:t>
+            </a:r>
+            <a:endParaRPr b="1" sz="1800">
               <a:solidFill>
                 <a:srgbClr val="E3FEF7"/>
               </a:solidFill>

</xml_diff>

<commit_message>
Added Role-Based Access Control
I have added the Role-Based Access Control subchapter.
</commit_message>
<xml_diff>
--- a/Access Control for XML - Presentation.pptx
+++ b/Access Control for XML - Presentation.pptx
@@ -25,6 +25,8 @@
     <p:sldId id="270" r:id="rId20"/>
     <p:sldId id="271" r:id="rId21"/>
     <p:sldId id="272" r:id="rId22"/>
+    <p:sldId id="273" r:id="rId23"/>
+    <p:sldId id="274" r:id="rId24"/>
   </p:sldIdLst>
   <p:sldSz cy="5143500" cx="9144000"/>
   <p:notesSz cx="6858000" cy="9144000"/>
@@ -919,7 +921,7 @@
       </p:grpSpPr>
       <p:sp>
         <p:nvSpPr>
-          <p:cNvPr id="120" name="Google Shape;120;g324d1e3a553_0_399:notes"/>
+          <p:cNvPr id="120" name="Google Shape;120;g325249bb49a_0_32:notes"/>
           <p:cNvSpPr/>
           <p:nvPr>
             <p:ph idx="2" type="sldImg"/>
@@ -954,7 +956,7 @@
       </p:sp>
       <p:sp>
         <p:nvSpPr>
-          <p:cNvPr id="121" name="Google Shape;121;g324d1e3a553_0_399:notes"/>
+          <p:cNvPr id="121" name="Google Shape;121;g325249bb49a_0_32:notes"/>
           <p:cNvSpPr txBox="1"/>
           <p:nvPr>
             <p:ph idx="1" type="body"/>
@@ -1018,7 +1020,7 @@
       </p:grpSpPr>
       <p:sp>
         <p:nvSpPr>
-          <p:cNvPr id="127" name="Google Shape;127;g324d1e3a553_0_405:notes"/>
+          <p:cNvPr id="127" name="Google Shape;127;g325249bb49a_0_38:notes"/>
           <p:cNvSpPr/>
           <p:nvPr>
             <p:ph idx="2" type="sldImg"/>
@@ -1053,7 +1055,7 @@
       </p:sp>
       <p:sp>
         <p:nvSpPr>
-          <p:cNvPr id="128" name="Google Shape;128;g324d1e3a553_0_405:notes"/>
+          <p:cNvPr id="128" name="Google Shape;128;g325249bb49a_0_38:notes"/>
           <p:cNvSpPr txBox="1"/>
           <p:nvPr>
             <p:ph idx="1" type="body"/>
@@ -1117,7 +1119,7 @@
       </p:grpSpPr>
       <p:sp>
         <p:nvSpPr>
-          <p:cNvPr id="134" name="Google Shape;134;g324d1e3a553_0_412:notes"/>
+          <p:cNvPr id="134" name="Google Shape;134;g324d1e3a553_0_399:notes"/>
           <p:cNvSpPr/>
           <p:nvPr>
             <p:ph idx="2" type="sldImg"/>
@@ -1152,7 +1154,7 @@
       </p:sp>
       <p:sp>
         <p:nvSpPr>
-          <p:cNvPr id="135" name="Google Shape;135;g324d1e3a553_0_412:notes"/>
+          <p:cNvPr id="135" name="Google Shape;135;g324d1e3a553_0_399:notes"/>
           <p:cNvSpPr txBox="1"/>
           <p:nvPr>
             <p:ph idx="1" type="body"/>
@@ -1216,7 +1218,7 @@
       </p:grpSpPr>
       <p:sp>
         <p:nvSpPr>
-          <p:cNvPr id="141" name="Google Shape;141;g324d1e3a553_0_420:notes"/>
+          <p:cNvPr id="141" name="Google Shape;141;g324d1e3a553_0_405:notes"/>
           <p:cNvSpPr/>
           <p:nvPr>
             <p:ph idx="2" type="sldImg"/>
@@ -1251,7 +1253,7 @@
       </p:sp>
       <p:sp>
         <p:nvSpPr>
-          <p:cNvPr id="142" name="Google Shape;142;g324d1e3a553_0_420:notes"/>
+          <p:cNvPr id="142" name="Google Shape;142;g324d1e3a553_0_405:notes"/>
           <p:cNvSpPr txBox="1"/>
           <p:nvPr>
             <p:ph idx="1" type="body"/>
@@ -1315,7 +1317,7 @@
       </p:grpSpPr>
       <p:sp>
         <p:nvSpPr>
-          <p:cNvPr id="148" name="Google Shape;148;g324d1e3a553_0_427:notes"/>
+          <p:cNvPr id="148" name="Google Shape;148;g324d1e3a553_0_412:notes"/>
           <p:cNvSpPr/>
           <p:nvPr>
             <p:ph idx="2" type="sldImg"/>
@@ -1350,7 +1352,7 @@
       </p:sp>
       <p:sp>
         <p:nvSpPr>
-          <p:cNvPr id="149" name="Google Shape;149;g324d1e3a553_0_427:notes"/>
+          <p:cNvPr id="149" name="Google Shape;149;g324d1e3a553_0_412:notes"/>
           <p:cNvSpPr txBox="1"/>
           <p:nvPr>
             <p:ph idx="1" type="body"/>
@@ -1400,7 +1402,7 @@
   <p:cSld>
     <p:spTree>
       <p:nvGrpSpPr>
-        <p:cNvPr id="153" name="Shape 153"/>
+        <p:cNvPr id="154" name="Shape 154"/>
         <p:cNvGrpSpPr/>
         <p:nvPr/>
       </p:nvGrpSpPr>
@@ -1414,7 +1416,7 @@
       </p:grpSpPr>
       <p:sp>
         <p:nvSpPr>
-          <p:cNvPr id="154" name="Google Shape;154;g324d1e3a553_0_434:notes"/>
+          <p:cNvPr id="155" name="Google Shape;155;g324d1e3a553_0_420:notes"/>
           <p:cNvSpPr/>
           <p:nvPr>
             <p:ph idx="2" type="sldImg"/>
@@ -1449,7 +1451,7 @@
       </p:sp>
       <p:sp>
         <p:nvSpPr>
-          <p:cNvPr id="155" name="Google Shape;155;g324d1e3a553_0_434:notes"/>
+          <p:cNvPr id="156" name="Google Shape;156;g324d1e3a553_0_420:notes"/>
           <p:cNvSpPr txBox="1"/>
           <p:nvPr>
             <p:ph idx="1" type="body"/>
@@ -1499,7 +1501,7 @@
   <p:cSld>
     <p:spTree>
       <p:nvGrpSpPr>
-        <p:cNvPr id="159" name="Shape 159"/>
+        <p:cNvPr id="161" name="Shape 161"/>
         <p:cNvGrpSpPr/>
         <p:nvPr/>
       </p:nvGrpSpPr>
@@ -1513,7 +1515,7 @@
       </p:grpSpPr>
       <p:sp>
         <p:nvSpPr>
-          <p:cNvPr id="160" name="Google Shape;160;g324d1e3a553_0_439:notes"/>
+          <p:cNvPr id="162" name="Google Shape;162;g324d1e3a553_0_427:notes"/>
           <p:cNvSpPr/>
           <p:nvPr>
             <p:ph idx="2" type="sldImg"/>
@@ -1548,7 +1550,205 @@
       </p:sp>
       <p:sp>
         <p:nvSpPr>
-          <p:cNvPr id="161" name="Google Shape;161;g324d1e3a553_0_439:notes"/>
+          <p:cNvPr id="163" name="Google Shape;163;g324d1e3a553_0_427:notes"/>
+          <p:cNvSpPr txBox="1"/>
+          <p:nvPr>
+            <p:ph idx="1" type="body"/>
+          </p:nvPr>
+        </p:nvSpPr>
+        <p:spPr>
+          <a:xfrm>
+            <a:off x="685800" y="4343400"/>
+            <a:ext cx="5486400" cy="4114800"/>
+          </a:xfrm>
+          <a:prstGeom prst="rect">
+            <a:avLst/>
+          </a:prstGeom>
+        </p:spPr>
+        <p:txBody>
+          <a:bodyPr anchorCtr="0" anchor="t" bIns="91425" lIns="91425" spcFirstLastPara="1" rIns="91425" wrap="square" tIns="91425">
+            <a:noAutofit/>
+          </a:bodyPr>
+          <a:lstStyle/>
+          <a:p>
+            <a:pPr indent="0" lvl="0" marL="0" rtl="0" algn="l">
+              <a:spcBef>
+                <a:spcPts val="0"/>
+              </a:spcBef>
+              <a:spcAft>
+                <a:spcPts val="0"/>
+              </a:spcAft>
+              <a:buNone/>
+            </a:pPr>
+            <a:r>
+              <a:t/>
+            </a:r>
+            <a:endParaRPr/>
+          </a:p>
+        </p:txBody>
+      </p:sp>
+    </p:spTree>
+  </p:cSld>
+  <p:clrMapOvr>
+    <a:masterClrMapping/>
+  </p:clrMapOvr>
+</p:notes>
+</file>
+
+<file path=ppt/notesSlides/notesSlide18.xml><?xml version="1.0" encoding="utf-8"?>
+<p:notes xmlns:a="http://schemas.openxmlformats.org/drawingml/2006/main" xmlns:r="http://schemas.openxmlformats.org/officeDocument/2006/relationships" xmlns:mc="http://schemas.openxmlformats.org/markup-compatibility/2006" xmlns:mv="urn:schemas-microsoft-com:mac:vml" xmlns:p="http://schemas.openxmlformats.org/presentationml/2006/main" xmlns:c="http://schemas.openxmlformats.org/drawingml/2006/chart" xmlns:dgm="http://schemas.openxmlformats.org/drawingml/2006/diagram" xmlns:o="urn:schemas-microsoft-com:office:office" xmlns:v="urn:schemas-microsoft-com:vml" xmlns:pvml="urn:schemas-microsoft-com:office:powerpoint" xmlns:com="http://schemas.openxmlformats.org/drawingml/2006/compatibility" xmlns:p14="http://schemas.microsoft.com/office/powerpoint/2010/main" xmlns:p15="http://schemas.microsoft.com/office/powerpoint/2012/main" xmlns:ahyp="http://schemas.microsoft.com/office/drawing/2018/hyperlinkcolor" showMasterPhAnim="0" showMasterSp="0">
+  <p:cSld>
+    <p:spTree>
+      <p:nvGrpSpPr>
+        <p:cNvPr id="167" name="Shape 167"/>
+        <p:cNvGrpSpPr/>
+        <p:nvPr/>
+      </p:nvGrpSpPr>
+      <p:grpSpPr>
+        <a:xfrm>
+          <a:off x="0" y="0"/>
+          <a:ext cx="0" cy="0"/>
+          <a:chOff x="0" y="0"/>
+          <a:chExt cx="0" cy="0"/>
+        </a:xfrm>
+      </p:grpSpPr>
+      <p:sp>
+        <p:nvSpPr>
+          <p:cNvPr id="168" name="Google Shape;168;g324d1e3a553_0_434:notes"/>
+          <p:cNvSpPr/>
+          <p:nvPr>
+            <p:ph idx="2" type="sldImg"/>
+          </p:nvPr>
+        </p:nvSpPr>
+        <p:spPr>
+          <a:xfrm>
+            <a:off x="381300" y="685800"/>
+            <a:ext cx="6096000" cy="3429000"/>
+          </a:xfrm>
+          <a:custGeom>
+            <a:rect b="b" l="l" r="r" t="t"/>
+            <a:pathLst>
+              <a:path extrusionOk="0" h="120000" w="120000">
+                <a:moveTo>
+                  <a:pt x="0" y="0"/>
+                </a:moveTo>
+                <a:lnTo>
+                  <a:pt x="120000" y="0"/>
+                </a:lnTo>
+                <a:lnTo>
+                  <a:pt x="120000" y="120000"/>
+                </a:lnTo>
+                <a:lnTo>
+                  <a:pt x="0" y="120000"/>
+                </a:lnTo>
+                <a:close/>
+              </a:path>
+            </a:pathLst>
+          </a:custGeom>
+        </p:spPr>
+      </p:sp>
+      <p:sp>
+        <p:nvSpPr>
+          <p:cNvPr id="169" name="Google Shape;169;g324d1e3a553_0_434:notes"/>
+          <p:cNvSpPr txBox="1"/>
+          <p:nvPr>
+            <p:ph idx="1" type="body"/>
+          </p:nvPr>
+        </p:nvSpPr>
+        <p:spPr>
+          <a:xfrm>
+            <a:off x="685800" y="4343400"/>
+            <a:ext cx="5486400" cy="4114800"/>
+          </a:xfrm>
+          <a:prstGeom prst="rect">
+            <a:avLst/>
+          </a:prstGeom>
+        </p:spPr>
+        <p:txBody>
+          <a:bodyPr anchorCtr="0" anchor="t" bIns="91425" lIns="91425" spcFirstLastPara="1" rIns="91425" wrap="square" tIns="91425">
+            <a:noAutofit/>
+          </a:bodyPr>
+          <a:lstStyle/>
+          <a:p>
+            <a:pPr indent="0" lvl="0" marL="0" rtl="0" algn="l">
+              <a:spcBef>
+                <a:spcPts val="0"/>
+              </a:spcBef>
+              <a:spcAft>
+                <a:spcPts val="0"/>
+              </a:spcAft>
+              <a:buNone/>
+            </a:pPr>
+            <a:r>
+              <a:t/>
+            </a:r>
+            <a:endParaRPr/>
+          </a:p>
+        </p:txBody>
+      </p:sp>
+    </p:spTree>
+  </p:cSld>
+  <p:clrMapOvr>
+    <a:masterClrMapping/>
+  </p:clrMapOvr>
+</p:notes>
+</file>
+
+<file path=ppt/notesSlides/notesSlide19.xml><?xml version="1.0" encoding="utf-8"?>
+<p:notes xmlns:a="http://schemas.openxmlformats.org/drawingml/2006/main" xmlns:r="http://schemas.openxmlformats.org/officeDocument/2006/relationships" xmlns:mc="http://schemas.openxmlformats.org/markup-compatibility/2006" xmlns:mv="urn:schemas-microsoft-com:mac:vml" xmlns:p="http://schemas.openxmlformats.org/presentationml/2006/main" xmlns:c="http://schemas.openxmlformats.org/drawingml/2006/chart" xmlns:dgm="http://schemas.openxmlformats.org/drawingml/2006/diagram" xmlns:o="urn:schemas-microsoft-com:office:office" xmlns:v="urn:schemas-microsoft-com:vml" xmlns:pvml="urn:schemas-microsoft-com:office:powerpoint" xmlns:com="http://schemas.openxmlformats.org/drawingml/2006/compatibility" xmlns:p14="http://schemas.microsoft.com/office/powerpoint/2010/main" xmlns:p15="http://schemas.microsoft.com/office/powerpoint/2012/main" xmlns:ahyp="http://schemas.microsoft.com/office/drawing/2018/hyperlinkcolor" showMasterPhAnim="0" showMasterSp="0">
+  <p:cSld>
+    <p:spTree>
+      <p:nvGrpSpPr>
+        <p:cNvPr id="173" name="Shape 173"/>
+        <p:cNvGrpSpPr/>
+        <p:nvPr/>
+      </p:nvGrpSpPr>
+      <p:grpSpPr>
+        <a:xfrm>
+          <a:off x="0" y="0"/>
+          <a:ext cx="0" cy="0"/>
+          <a:chOff x="0" y="0"/>
+          <a:chExt cx="0" cy="0"/>
+        </a:xfrm>
+      </p:grpSpPr>
+      <p:sp>
+        <p:nvSpPr>
+          <p:cNvPr id="174" name="Google Shape;174;g324d1e3a553_0_439:notes"/>
+          <p:cNvSpPr/>
+          <p:nvPr>
+            <p:ph idx="2" type="sldImg"/>
+          </p:nvPr>
+        </p:nvSpPr>
+        <p:spPr>
+          <a:xfrm>
+            <a:off x="381300" y="685800"/>
+            <a:ext cx="6096000" cy="3429000"/>
+          </a:xfrm>
+          <a:custGeom>
+            <a:rect b="b" l="l" r="r" t="t"/>
+            <a:pathLst>
+              <a:path extrusionOk="0" h="120000" w="120000">
+                <a:moveTo>
+                  <a:pt x="0" y="0"/>
+                </a:moveTo>
+                <a:lnTo>
+                  <a:pt x="120000" y="0"/>
+                </a:lnTo>
+                <a:lnTo>
+                  <a:pt x="120000" y="120000"/>
+                </a:lnTo>
+                <a:lnTo>
+                  <a:pt x="0" y="120000"/>
+                </a:lnTo>
+                <a:close/>
+              </a:path>
+            </a:pathLst>
+          </a:custGeom>
+        </p:spPr>
+      </p:sp>
+      <p:sp>
+        <p:nvSpPr>
+          <p:cNvPr id="175" name="Google Shape;175;g324d1e3a553_0_439:notes"/>
           <p:cNvSpPr txBox="1"/>
           <p:nvPr>
             <p:ph idx="1" type="body"/>
@@ -7402,7 +7602,7 @@
                   <a:srgbClr val="E3FEF7"/>
                 </a:solidFill>
               </a:rPr>
-              <a:t>XML Access Control Models</a:t>
+              <a:t>Modele de Control al Accesului XML</a:t>
             </a:r>
             <a:endParaRPr b="1" sz="4000">
               <a:solidFill>
@@ -7415,56 +7615,6 @@
       <p:sp>
         <p:nvSpPr>
           <p:cNvPr id="117" name="Google Shape;117;p22"/>
-          <p:cNvSpPr txBox="1"/>
-          <p:nvPr/>
-        </p:nvSpPr>
-        <p:spPr>
-          <a:xfrm>
-            <a:off x="479750" y="1793125"/>
-            <a:ext cx="8234400" cy="2917800"/>
-          </a:xfrm>
-          <a:prstGeom prst="rect">
-            <a:avLst/>
-          </a:prstGeom>
-          <a:noFill/>
-          <a:ln>
-            <a:noFill/>
-          </a:ln>
-        </p:spPr>
-        <p:txBody>
-          <a:bodyPr anchorCtr="0" anchor="ctr" bIns="91425" lIns="91425" spcFirstLastPara="1" rIns="91425" wrap="square" tIns="91425">
-            <a:noAutofit/>
-          </a:bodyPr>
-          <a:lstStyle/>
-          <a:p>
-            <a:pPr indent="0" lvl="0" marL="0" rtl="0" algn="ctr">
-              <a:spcBef>
-                <a:spcPts val="0"/>
-              </a:spcBef>
-              <a:spcAft>
-                <a:spcPts val="0"/>
-              </a:spcAft>
-              <a:buNone/>
-            </a:pPr>
-            <a:r>
-              <a:rPr lang="en" sz="1800">
-                <a:solidFill>
-                  <a:srgbClr val="E3FEF7"/>
-                </a:solidFill>
-              </a:rPr>
-              <a:t>Write here.</a:t>
-            </a:r>
-            <a:endParaRPr i="1" sz="1800">
-              <a:solidFill>
-                <a:srgbClr val="E3FEF7"/>
-              </a:solidFill>
-            </a:endParaRPr>
-          </a:p>
-        </p:txBody>
-      </p:sp>
-      <p:sp>
-        <p:nvSpPr>
-          <p:cNvPr id="118" name="Google Shape;118;p22"/>
           <p:cNvSpPr txBox="1"/>
           <p:nvPr/>
         </p:nvSpPr>
@@ -7502,9 +7652,260 @@
                   <a:srgbClr val="E3FEF7"/>
                 </a:solidFill>
               </a:rPr>
-              <a:t>Role-Based Access Control for XML</a:t>
+              <a:t>Controlul Accesului Bazat pe Roluri pentru XML</a:t>
             </a:r>
             <a:endParaRPr b="1" sz="2600">
+              <a:solidFill>
+                <a:srgbClr val="E3FEF7"/>
+              </a:solidFill>
+            </a:endParaRPr>
+          </a:p>
+        </p:txBody>
+      </p:sp>
+      <p:sp>
+        <p:nvSpPr>
+          <p:cNvPr id="118" name="Google Shape;118;p22"/>
+          <p:cNvSpPr txBox="1"/>
+          <p:nvPr/>
+        </p:nvSpPr>
+        <p:spPr>
+          <a:xfrm>
+            <a:off x="454800" y="1557300"/>
+            <a:ext cx="8234400" cy="3303000"/>
+          </a:xfrm>
+          <a:prstGeom prst="rect">
+            <a:avLst/>
+          </a:prstGeom>
+          <a:noFill/>
+          <a:ln>
+            <a:noFill/>
+          </a:ln>
+        </p:spPr>
+        <p:txBody>
+          <a:bodyPr anchorCtr="0" anchor="t" bIns="91425" lIns="91425" spcFirstLastPara="1" rIns="91425" wrap="square" tIns="91425">
+            <a:noAutofit/>
+          </a:bodyPr>
+          <a:lstStyle/>
+          <a:p>
+            <a:pPr indent="-342900" lvl="0" marL="457200" rtl="0" algn="l">
+              <a:lnSpc>
+                <a:spcPct val="130000"/>
+              </a:lnSpc>
+              <a:spcBef>
+                <a:spcPts val="0"/>
+              </a:spcBef>
+              <a:spcAft>
+                <a:spcPts val="0"/>
+              </a:spcAft>
+              <a:buClr>
+                <a:srgbClr val="E3FEF7"/>
+              </a:buClr>
+              <a:buSzPts val="1800"/>
+              <a:buChar char="●"/>
+            </a:pPr>
+            <a:r>
+              <a:rPr b="1" lang="en" sz="1800">
+                <a:solidFill>
+                  <a:srgbClr val="E3FEF7"/>
+                </a:solidFill>
+              </a:rPr>
+              <a:t>Definiție</a:t>
+            </a:r>
+            <a:r>
+              <a:rPr b="1" lang="en" sz="1800">
+                <a:solidFill>
+                  <a:srgbClr val="E3FEF7"/>
+                </a:solidFill>
+              </a:rPr>
+              <a:t>:</a:t>
+            </a:r>
+            <a:endParaRPr b="1" sz="1800">
+              <a:solidFill>
+                <a:srgbClr val="E3FEF7"/>
+              </a:solidFill>
+            </a:endParaRPr>
+          </a:p>
+          <a:p>
+            <a:pPr indent="-342900" lvl="1" marL="914400" rtl="0" algn="l">
+              <a:lnSpc>
+                <a:spcPct val="130000"/>
+              </a:lnSpc>
+              <a:spcBef>
+                <a:spcPts val="0"/>
+              </a:spcBef>
+              <a:spcAft>
+                <a:spcPts val="0"/>
+              </a:spcAft>
+              <a:buClr>
+                <a:srgbClr val="E3FEF7"/>
+              </a:buClr>
+              <a:buSzPts val="1800"/>
+              <a:buChar char="○"/>
+            </a:pPr>
+            <a:r>
+              <a:rPr b="1" lang="en" sz="1800">
+                <a:solidFill>
+                  <a:srgbClr val="E3FEF7"/>
+                </a:solidFill>
+              </a:rPr>
+              <a:t>Permite gestionarea drepturilor de acces prin atribuirea de roluri utilizatorilor, nu individualizat.</a:t>
+            </a:r>
+            <a:endParaRPr b="1" sz="1800">
+              <a:solidFill>
+                <a:srgbClr val="E3FEF7"/>
+              </a:solidFill>
+            </a:endParaRPr>
+          </a:p>
+          <a:p>
+            <a:pPr indent="-342900" lvl="0" marL="457200" rtl="0" algn="l">
+              <a:lnSpc>
+                <a:spcPct val="130000"/>
+              </a:lnSpc>
+              <a:spcBef>
+                <a:spcPts val="0"/>
+              </a:spcBef>
+              <a:spcAft>
+                <a:spcPts val="0"/>
+              </a:spcAft>
+              <a:buClr>
+                <a:srgbClr val="E3FEF7"/>
+              </a:buClr>
+              <a:buSzPts val="1800"/>
+              <a:buChar char="●"/>
+            </a:pPr>
+            <a:r>
+              <a:rPr b="1" lang="en" sz="1800">
+                <a:solidFill>
+                  <a:srgbClr val="E3FEF7"/>
+                </a:solidFill>
+              </a:rPr>
+              <a:t>Principiul RBAC:</a:t>
+            </a:r>
+            <a:endParaRPr b="1" sz="1800">
+              <a:solidFill>
+                <a:srgbClr val="E3FEF7"/>
+              </a:solidFill>
+            </a:endParaRPr>
+          </a:p>
+          <a:p>
+            <a:pPr indent="-342900" lvl="1" marL="914400" rtl="0" algn="l">
+              <a:lnSpc>
+                <a:spcPct val="130000"/>
+              </a:lnSpc>
+              <a:spcBef>
+                <a:spcPts val="0"/>
+              </a:spcBef>
+              <a:spcAft>
+                <a:spcPts val="0"/>
+              </a:spcAft>
+              <a:buClr>
+                <a:srgbClr val="E3FEF7"/>
+              </a:buClr>
+              <a:buSzPts val="1800"/>
+              <a:buChar char="○"/>
+            </a:pPr>
+            <a:r>
+              <a:rPr b="1" lang="en" sz="1800">
+                <a:solidFill>
+                  <a:srgbClr val="E3FEF7"/>
+                </a:solidFill>
+              </a:rPr>
+              <a:t>Roluri:</a:t>
+            </a:r>
+            <a:endParaRPr b="1" sz="1800">
+              <a:solidFill>
+                <a:srgbClr val="E3FEF7"/>
+              </a:solidFill>
+            </a:endParaRPr>
+          </a:p>
+          <a:p>
+            <a:pPr indent="-342900" lvl="2" marL="1371600" rtl="0" algn="l">
+              <a:lnSpc>
+                <a:spcPct val="130000"/>
+              </a:lnSpc>
+              <a:spcBef>
+                <a:spcPts val="0"/>
+              </a:spcBef>
+              <a:spcAft>
+                <a:spcPts val="0"/>
+              </a:spcAft>
+              <a:buClr>
+                <a:srgbClr val="E3FEF7"/>
+              </a:buClr>
+              <a:buSzPts val="1800"/>
+              <a:buChar char="■"/>
+            </a:pPr>
+            <a:r>
+              <a:rPr b="1" lang="en" sz="1800">
+                <a:solidFill>
+                  <a:srgbClr val="E3FEF7"/>
+                </a:solidFill>
+              </a:rPr>
+              <a:t>Grupuri de utilizatori cu permisiuni specifice.</a:t>
+            </a:r>
+            <a:endParaRPr b="1" sz="1800">
+              <a:solidFill>
+                <a:srgbClr val="E3FEF7"/>
+              </a:solidFill>
+            </a:endParaRPr>
+          </a:p>
+          <a:p>
+            <a:pPr indent="-342900" lvl="1" marL="914400" rtl="0" algn="l">
+              <a:lnSpc>
+                <a:spcPct val="130000"/>
+              </a:lnSpc>
+              <a:spcBef>
+                <a:spcPts val="0"/>
+              </a:spcBef>
+              <a:spcAft>
+                <a:spcPts val="0"/>
+              </a:spcAft>
+              <a:buClr>
+                <a:srgbClr val="E3FEF7"/>
+              </a:buClr>
+              <a:buSzPts val="1800"/>
+              <a:buChar char="○"/>
+            </a:pPr>
+            <a:r>
+              <a:rPr b="1" lang="en" sz="1800">
+                <a:solidFill>
+                  <a:srgbClr val="E3FEF7"/>
+                </a:solidFill>
+              </a:rPr>
+              <a:t>Permisiuni:</a:t>
+            </a:r>
+            <a:endParaRPr b="1" sz="1800">
+              <a:solidFill>
+                <a:srgbClr val="E3FEF7"/>
+              </a:solidFill>
+            </a:endParaRPr>
+          </a:p>
+          <a:p>
+            <a:pPr indent="-342900" lvl="2" marL="1371600" rtl="0" algn="l">
+              <a:lnSpc>
+                <a:spcPct val="130000"/>
+              </a:lnSpc>
+              <a:spcBef>
+                <a:spcPts val="0"/>
+              </a:spcBef>
+              <a:spcAft>
+                <a:spcPts val="0"/>
+              </a:spcAft>
+              <a:buClr>
+                <a:srgbClr val="E3FEF7"/>
+              </a:buClr>
+              <a:buSzPts val="1800"/>
+              <a:buChar char="■"/>
+            </a:pPr>
+            <a:r>
+              <a:rPr b="1" lang="en" sz="1800">
+                <a:solidFill>
+                  <a:srgbClr val="E3FEF7"/>
+                </a:solidFill>
+              </a:rPr>
+              <a:t>Definirea acțiunilor posibile pentru fiecare rol (ex. citire, scriere).</a:t>
+            </a:r>
+            <a:endParaRPr b="1" sz="1800">
               <a:solidFill>
                 <a:srgbClr val="E3FEF7"/>
               </a:solidFill>
@@ -7584,7 +7985,7 @@
                   <a:srgbClr val="E3FEF7"/>
                 </a:solidFill>
               </a:rPr>
-              <a:t>Access Control Policy Languages</a:t>
+              <a:t>Modele de Control al Accesului XML</a:t>
             </a:r>
             <a:endParaRPr b="1" sz="4000">
               <a:solidFill>
@@ -7597,56 +7998,6 @@
       <p:sp>
         <p:nvSpPr>
           <p:cNvPr id="124" name="Google Shape;124;p23"/>
-          <p:cNvSpPr txBox="1"/>
-          <p:nvPr/>
-        </p:nvSpPr>
-        <p:spPr>
-          <a:xfrm>
-            <a:off x="479750" y="1793125"/>
-            <a:ext cx="8234400" cy="2917800"/>
-          </a:xfrm>
-          <a:prstGeom prst="rect">
-            <a:avLst/>
-          </a:prstGeom>
-          <a:noFill/>
-          <a:ln>
-            <a:noFill/>
-          </a:ln>
-        </p:spPr>
-        <p:txBody>
-          <a:bodyPr anchorCtr="0" anchor="ctr" bIns="91425" lIns="91425" spcFirstLastPara="1" rIns="91425" wrap="square" tIns="91425">
-            <a:noAutofit/>
-          </a:bodyPr>
-          <a:lstStyle/>
-          <a:p>
-            <a:pPr indent="0" lvl="0" marL="0" rtl="0" algn="ctr">
-              <a:spcBef>
-                <a:spcPts val="0"/>
-              </a:spcBef>
-              <a:spcAft>
-                <a:spcPts val="0"/>
-              </a:spcAft>
-              <a:buNone/>
-            </a:pPr>
-            <a:r>
-              <a:rPr lang="en" sz="1800">
-                <a:solidFill>
-                  <a:srgbClr val="E3FEF7"/>
-                </a:solidFill>
-              </a:rPr>
-              <a:t>Write here.</a:t>
-            </a:r>
-            <a:endParaRPr i="1" sz="1800">
-              <a:solidFill>
-                <a:srgbClr val="E3FEF7"/>
-              </a:solidFill>
-            </a:endParaRPr>
-          </a:p>
-        </p:txBody>
-      </p:sp>
-      <p:sp>
-        <p:nvSpPr>
-          <p:cNvPr id="125" name="Google Shape;125;p23"/>
           <p:cNvSpPr txBox="1"/>
           <p:nvPr/>
         </p:nvSpPr>
@@ -7684,9 +8035,167 @@
                   <a:srgbClr val="E3FEF7"/>
                 </a:solidFill>
               </a:rPr>
-              <a:t>XACML</a:t>
+              <a:t>Controlul Accesului Bazat pe Roluri pentru XML</a:t>
             </a:r>
             <a:endParaRPr b="1" sz="2600">
+              <a:solidFill>
+                <a:srgbClr val="E3FEF7"/>
+              </a:solidFill>
+            </a:endParaRPr>
+          </a:p>
+        </p:txBody>
+      </p:sp>
+      <p:sp>
+        <p:nvSpPr>
+          <p:cNvPr id="125" name="Google Shape;125;p23"/>
+          <p:cNvSpPr txBox="1"/>
+          <p:nvPr/>
+        </p:nvSpPr>
+        <p:spPr>
+          <a:xfrm>
+            <a:off x="454800" y="1557300"/>
+            <a:ext cx="8234400" cy="3303000"/>
+          </a:xfrm>
+          <a:prstGeom prst="rect">
+            <a:avLst/>
+          </a:prstGeom>
+          <a:noFill/>
+          <a:ln>
+            <a:noFill/>
+          </a:ln>
+        </p:spPr>
+        <p:txBody>
+          <a:bodyPr anchorCtr="0" anchor="t" bIns="91425" lIns="91425" spcFirstLastPara="1" rIns="91425" wrap="square" tIns="91425">
+            <a:noAutofit/>
+          </a:bodyPr>
+          <a:lstStyle/>
+          <a:p>
+            <a:pPr indent="-342900" lvl="0" marL="457200" rtl="0" algn="l">
+              <a:lnSpc>
+                <a:spcPct val="130000"/>
+              </a:lnSpc>
+              <a:spcBef>
+                <a:spcPts val="0"/>
+              </a:spcBef>
+              <a:spcAft>
+                <a:spcPts val="0"/>
+              </a:spcAft>
+              <a:buClr>
+                <a:srgbClr val="E3FEF7"/>
+              </a:buClr>
+              <a:buSzPts val="1800"/>
+              <a:buChar char="●"/>
+            </a:pPr>
+            <a:r>
+              <a:rPr b="1" lang="en" sz="1800">
+                <a:solidFill>
+                  <a:srgbClr val="E3FEF7"/>
+                </a:solidFill>
+              </a:rPr>
+              <a:t>Aplicabilitate în XML</a:t>
+            </a:r>
+            <a:r>
+              <a:rPr b="1" lang="en" sz="1800">
+                <a:solidFill>
+                  <a:srgbClr val="E3FEF7"/>
+                </a:solidFill>
+              </a:rPr>
+              <a:t>:</a:t>
+            </a:r>
+            <a:endParaRPr b="1" sz="1800">
+              <a:solidFill>
+                <a:srgbClr val="E3FEF7"/>
+              </a:solidFill>
+            </a:endParaRPr>
+          </a:p>
+          <a:p>
+            <a:pPr indent="-342900" lvl="1" marL="914400" rtl="0" algn="l">
+              <a:lnSpc>
+                <a:spcPct val="130000"/>
+              </a:lnSpc>
+              <a:spcBef>
+                <a:spcPts val="0"/>
+              </a:spcBef>
+              <a:spcAft>
+                <a:spcPts val="0"/>
+              </a:spcAft>
+              <a:buClr>
+                <a:srgbClr val="E3FEF7"/>
+              </a:buClr>
+              <a:buSzPts val="1800"/>
+              <a:buChar char="○"/>
+            </a:pPr>
+            <a:r>
+              <a:rPr b="1" lang="en" sz="1800">
+                <a:solidFill>
+                  <a:srgbClr val="E3FEF7"/>
+                </a:solidFill>
+              </a:rPr>
+              <a:t>Restricționează accesul la elemente/atribute ale unui document XML în funcție de rolul utilizatorului.</a:t>
+            </a:r>
+            <a:endParaRPr b="1" sz="1800">
+              <a:solidFill>
+                <a:srgbClr val="E3FEF7"/>
+              </a:solidFill>
+            </a:endParaRPr>
+          </a:p>
+          <a:p>
+            <a:pPr indent="-342900" lvl="1" marL="914400" rtl="0" algn="l">
+              <a:lnSpc>
+                <a:spcPct val="130000"/>
+              </a:lnSpc>
+              <a:spcBef>
+                <a:spcPts val="0"/>
+              </a:spcBef>
+              <a:spcAft>
+                <a:spcPts val="0"/>
+              </a:spcAft>
+              <a:buClr>
+                <a:srgbClr val="E3FEF7"/>
+              </a:buClr>
+              <a:buSzPts val="1800"/>
+              <a:buChar char="○"/>
+            </a:pPr>
+            <a:r>
+              <a:rPr b="1" lang="en" sz="1800">
+                <a:solidFill>
+                  <a:srgbClr val="E3FEF7"/>
+                </a:solidFill>
+              </a:rPr>
+              <a:t>Exemple:</a:t>
+            </a:r>
+            <a:endParaRPr b="1" sz="1800">
+              <a:solidFill>
+                <a:srgbClr val="E3FEF7"/>
+              </a:solidFill>
+            </a:endParaRPr>
+          </a:p>
+          <a:p>
+            <a:pPr indent="-342900" lvl="2" marL="1371600" rtl="0" algn="l">
+              <a:lnSpc>
+                <a:spcPct val="130000"/>
+              </a:lnSpc>
+              <a:spcBef>
+                <a:spcPts val="0"/>
+              </a:spcBef>
+              <a:spcAft>
+                <a:spcPts val="0"/>
+              </a:spcAft>
+              <a:buClr>
+                <a:srgbClr val="E3FEF7"/>
+              </a:buClr>
+              <a:buSzPts val="1800"/>
+              <a:buChar char="■"/>
+            </a:pPr>
+            <a:r>
+              <a:rPr b="1" lang="en" sz="1800">
+                <a:solidFill>
+                  <a:srgbClr val="E3FEF7"/>
+                </a:solidFill>
+              </a:rPr>
+              <a:t>Rol „HR” pentru acces la datele salariale, „Manager” pentru informațiile complete ale angajatului.</a:t>
+            </a:r>
+            <a:endParaRPr b="1" sz="1800">
               <a:solidFill>
                 <a:srgbClr val="E3FEF7"/>
               </a:solidFill>
@@ -7766,7 +8275,7 @@
                   <a:srgbClr val="E3FEF7"/>
                 </a:solidFill>
               </a:rPr>
-              <a:t>Access Control Policy Languages</a:t>
+              <a:t>Modele de Control al Accesului XML</a:t>
             </a:r>
             <a:endParaRPr b="1" sz="4000">
               <a:solidFill>
@@ -7779,56 +8288,6 @@
       <p:sp>
         <p:nvSpPr>
           <p:cNvPr id="131" name="Google Shape;131;p24"/>
-          <p:cNvSpPr txBox="1"/>
-          <p:nvPr/>
-        </p:nvSpPr>
-        <p:spPr>
-          <a:xfrm>
-            <a:off x="479750" y="1793125"/>
-            <a:ext cx="8234400" cy="2917800"/>
-          </a:xfrm>
-          <a:prstGeom prst="rect">
-            <a:avLst/>
-          </a:prstGeom>
-          <a:noFill/>
-          <a:ln>
-            <a:noFill/>
-          </a:ln>
-        </p:spPr>
-        <p:txBody>
-          <a:bodyPr anchorCtr="0" anchor="ctr" bIns="91425" lIns="91425" spcFirstLastPara="1" rIns="91425" wrap="square" tIns="91425">
-            <a:noAutofit/>
-          </a:bodyPr>
-          <a:lstStyle/>
-          <a:p>
-            <a:pPr indent="0" lvl="0" marL="0" rtl="0" algn="ctr">
-              <a:spcBef>
-                <a:spcPts val="0"/>
-              </a:spcBef>
-              <a:spcAft>
-                <a:spcPts val="0"/>
-              </a:spcAft>
-              <a:buNone/>
-            </a:pPr>
-            <a:r>
-              <a:rPr lang="en" sz="1800">
-                <a:solidFill>
-                  <a:srgbClr val="E3FEF7"/>
-                </a:solidFill>
-              </a:rPr>
-              <a:t>Write here.</a:t>
-            </a:r>
-            <a:endParaRPr i="1" sz="1800">
-              <a:solidFill>
-                <a:srgbClr val="E3FEF7"/>
-              </a:solidFill>
-            </a:endParaRPr>
-          </a:p>
-        </p:txBody>
-      </p:sp>
-      <p:sp>
-        <p:nvSpPr>
-          <p:cNvPr id="132" name="Google Shape;132;p24"/>
           <p:cNvSpPr txBox="1"/>
           <p:nvPr/>
         </p:nvSpPr>
@@ -7866,9 +8325,229 @@
                   <a:srgbClr val="E3FEF7"/>
                 </a:solidFill>
               </a:rPr>
-              <a:t>Custom Policy Specifications</a:t>
+              <a:t>Controlul Accesului Bazat pe Roluri pentru XML</a:t>
             </a:r>
             <a:endParaRPr b="1" sz="2600">
+              <a:solidFill>
+                <a:srgbClr val="E3FEF7"/>
+              </a:solidFill>
+            </a:endParaRPr>
+          </a:p>
+        </p:txBody>
+      </p:sp>
+      <p:sp>
+        <p:nvSpPr>
+          <p:cNvPr id="132" name="Google Shape;132;p24"/>
+          <p:cNvSpPr txBox="1"/>
+          <p:nvPr/>
+        </p:nvSpPr>
+        <p:spPr>
+          <a:xfrm>
+            <a:off x="454800" y="1557300"/>
+            <a:ext cx="8234400" cy="3303000"/>
+          </a:xfrm>
+          <a:prstGeom prst="rect">
+            <a:avLst/>
+          </a:prstGeom>
+          <a:noFill/>
+          <a:ln>
+            <a:noFill/>
+          </a:ln>
+        </p:spPr>
+        <p:txBody>
+          <a:bodyPr anchorCtr="0" anchor="t" bIns="91425" lIns="91425" spcFirstLastPara="1" rIns="91425" wrap="square" tIns="91425">
+            <a:noAutofit/>
+          </a:bodyPr>
+          <a:lstStyle/>
+          <a:p>
+            <a:pPr indent="-342900" lvl="0" marL="457200" rtl="0" algn="l">
+              <a:lnSpc>
+                <a:spcPct val="130000"/>
+              </a:lnSpc>
+              <a:spcBef>
+                <a:spcPts val="0"/>
+              </a:spcBef>
+              <a:spcAft>
+                <a:spcPts val="0"/>
+              </a:spcAft>
+              <a:buClr>
+                <a:srgbClr val="E3FEF7"/>
+              </a:buClr>
+              <a:buSzPts val="1800"/>
+              <a:buChar char="●"/>
+            </a:pPr>
+            <a:r>
+              <a:rPr b="1" lang="en" sz="1800">
+                <a:solidFill>
+                  <a:srgbClr val="E3FEF7"/>
+                </a:solidFill>
+              </a:rPr>
+              <a:t>Implementare:</a:t>
+            </a:r>
+            <a:endParaRPr b="1" sz="1800">
+              <a:solidFill>
+                <a:srgbClr val="E3FEF7"/>
+              </a:solidFill>
+            </a:endParaRPr>
+          </a:p>
+          <a:p>
+            <a:pPr indent="-342900" lvl="1" marL="914400" rtl="0" algn="l">
+              <a:lnSpc>
+                <a:spcPct val="130000"/>
+              </a:lnSpc>
+              <a:spcBef>
+                <a:spcPts val="0"/>
+              </a:spcBef>
+              <a:spcAft>
+                <a:spcPts val="0"/>
+              </a:spcAft>
+              <a:buClr>
+                <a:srgbClr val="E3FEF7"/>
+              </a:buClr>
+              <a:buSzPts val="1800"/>
+              <a:buChar char="○"/>
+            </a:pPr>
+            <a:r>
+              <a:rPr b="1" lang="en" sz="1800">
+                <a:solidFill>
+                  <a:srgbClr val="E3FEF7"/>
+                </a:solidFill>
+              </a:rPr>
+              <a:t>Utilizarea de politici de acces și limbaje precum XACML pentru a lega rolurile de resursele XML.</a:t>
+            </a:r>
+            <a:endParaRPr b="1" sz="1800">
+              <a:solidFill>
+                <a:srgbClr val="E3FEF7"/>
+              </a:solidFill>
+            </a:endParaRPr>
+          </a:p>
+          <a:p>
+            <a:pPr indent="-342900" lvl="0" marL="457200" rtl="0" algn="l">
+              <a:lnSpc>
+                <a:spcPct val="130000"/>
+              </a:lnSpc>
+              <a:spcBef>
+                <a:spcPts val="0"/>
+              </a:spcBef>
+              <a:spcAft>
+                <a:spcPts val="0"/>
+              </a:spcAft>
+              <a:buClr>
+                <a:srgbClr val="E3FEF7"/>
+              </a:buClr>
+              <a:buSzPts val="1800"/>
+              <a:buChar char="●"/>
+            </a:pPr>
+            <a:r>
+              <a:rPr b="1" lang="en" sz="1800">
+                <a:solidFill>
+                  <a:srgbClr val="E3FEF7"/>
+                </a:solidFill>
+              </a:rPr>
+              <a:t>Avantaje</a:t>
+            </a:r>
+            <a:r>
+              <a:rPr b="1" lang="en" sz="1800">
+                <a:solidFill>
+                  <a:srgbClr val="E3FEF7"/>
+                </a:solidFill>
+              </a:rPr>
+              <a:t>:</a:t>
+            </a:r>
+            <a:endParaRPr b="1" sz="1800">
+              <a:solidFill>
+                <a:srgbClr val="E3FEF7"/>
+              </a:solidFill>
+            </a:endParaRPr>
+          </a:p>
+          <a:p>
+            <a:pPr indent="-342900" lvl="1" marL="914400" rtl="0" algn="l">
+              <a:lnSpc>
+                <a:spcPct val="130000"/>
+              </a:lnSpc>
+              <a:spcBef>
+                <a:spcPts val="0"/>
+              </a:spcBef>
+              <a:spcAft>
+                <a:spcPts val="0"/>
+              </a:spcAft>
+              <a:buClr>
+                <a:srgbClr val="E3FEF7"/>
+              </a:buClr>
+              <a:buSzPts val="1800"/>
+              <a:buChar char="○"/>
+            </a:pPr>
+            <a:r>
+              <a:rPr b="1" lang="en" sz="1800">
+                <a:solidFill>
+                  <a:srgbClr val="E3FEF7"/>
+                </a:solidFill>
+              </a:rPr>
+              <a:t>Simplifică administrarea permisiunilor și reduce complexitatea.</a:t>
+            </a:r>
+            <a:endParaRPr b="1" sz="1800">
+              <a:solidFill>
+                <a:srgbClr val="E3FEF7"/>
+              </a:solidFill>
+            </a:endParaRPr>
+          </a:p>
+          <a:p>
+            <a:pPr indent="-342900" lvl="0" marL="457200" rtl="0" algn="l">
+              <a:lnSpc>
+                <a:spcPct val="130000"/>
+              </a:lnSpc>
+              <a:spcBef>
+                <a:spcPts val="0"/>
+              </a:spcBef>
+              <a:spcAft>
+                <a:spcPts val="0"/>
+              </a:spcAft>
+              <a:buClr>
+                <a:srgbClr val="E3FEF7"/>
+              </a:buClr>
+              <a:buSzPts val="1800"/>
+              <a:buChar char="●"/>
+            </a:pPr>
+            <a:r>
+              <a:rPr b="1" lang="en" sz="1800">
+                <a:solidFill>
+                  <a:srgbClr val="E3FEF7"/>
+                </a:solidFill>
+              </a:rPr>
+              <a:t>Provocări:</a:t>
+            </a:r>
+            <a:endParaRPr b="1" sz="1800">
+              <a:solidFill>
+                <a:srgbClr val="E3FEF7"/>
+              </a:solidFill>
+            </a:endParaRPr>
+          </a:p>
+          <a:p>
+            <a:pPr indent="-342900" lvl="1" marL="914400" rtl="0" algn="l">
+              <a:lnSpc>
+                <a:spcPct val="130000"/>
+              </a:lnSpc>
+              <a:spcBef>
+                <a:spcPts val="0"/>
+              </a:spcBef>
+              <a:spcAft>
+                <a:spcPts val="0"/>
+              </a:spcAft>
+              <a:buClr>
+                <a:srgbClr val="E3FEF7"/>
+              </a:buClr>
+              <a:buSzPts val="1800"/>
+              <a:buChar char="○"/>
+            </a:pPr>
+            <a:r>
+              <a:rPr b="1" lang="en" sz="1800">
+                <a:solidFill>
+                  <a:srgbClr val="E3FEF7"/>
+                </a:solidFill>
+              </a:rPr>
+              <a:t>Dificultăți în organizarea rolurilor complexe și în gestionarea accesului detaliat.</a:t>
+            </a:r>
+            <a:endParaRPr b="1" sz="1800">
               <a:solidFill>
                 <a:srgbClr val="E3FEF7"/>
               </a:solidFill>
@@ -7948,7 +8627,7 @@
                   <a:srgbClr val="E3FEF7"/>
                 </a:solidFill>
               </a:rPr>
-              <a:t>Implementation Approaches</a:t>
+              <a:t>Access Control Policy Languages</a:t>
             </a:r>
             <a:endParaRPr b="1" sz="4000">
               <a:solidFill>
@@ -8048,7 +8727,7 @@
                   <a:srgbClr val="E3FEF7"/>
                 </a:solidFill>
               </a:rPr>
-              <a:t>Enforcement Mechanisms</a:t>
+              <a:t>XACML</a:t>
             </a:r>
             <a:endParaRPr b="1" sz="2600">
               <a:solidFill>
@@ -8130,7 +8809,7 @@
                   <a:srgbClr val="E3FEF7"/>
                 </a:solidFill>
               </a:rPr>
-              <a:t>Implementation Approaches</a:t>
+              <a:t>Access Control Policy Languages</a:t>
             </a:r>
             <a:endParaRPr b="1" sz="4000">
               <a:solidFill>
@@ -8230,7 +8909,7 @@
                   <a:srgbClr val="E3FEF7"/>
                 </a:solidFill>
               </a:rPr>
-              <a:t>Performance Considerations</a:t>
+              <a:t>Custom Policy Specifications</a:t>
             </a:r>
             <a:endParaRPr b="1" sz="2600">
               <a:solidFill>
@@ -8312,7 +8991,7 @@
                   <a:srgbClr val="E3FEF7"/>
                 </a:solidFill>
               </a:rPr>
-              <a:t>Case Studies</a:t>
+              <a:t>Implementation Approaches</a:t>
             </a:r>
             <a:endParaRPr b="1" sz="4000">
               <a:solidFill>
@@ -8372,6 +9051,56 @@
           </a:p>
         </p:txBody>
       </p:sp>
+      <p:sp>
+        <p:nvSpPr>
+          <p:cNvPr id="153" name="Google Shape;153;p27"/>
+          <p:cNvSpPr txBox="1"/>
+          <p:nvPr/>
+        </p:nvSpPr>
+        <p:spPr>
+          <a:xfrm>
+            <a:off x="0" y="1061700"/>
+            <a:ext cx="9144000" cy="495600"/>
+          </a:xfrm>
+          <a:prstGeom prst="rect">
+            <a:avLst/>
+          </a:prstGeom>
+          <a:noFill/>
+          <a:ln>
+            <a:noFill/>
+          </a:ln>
+        </p:spPr>
+        <p:txBody>
+          <a:bodyPr anchorCtr="0" anchor="ctr" bIns="91425" lIns="91425" spcFirstLastPara="1" rIns="91425" wrap="square" tIns="91425">
+            <a:noAutofit/>
+          </a:bodyPr>
+          <a:lstStyle/>
+          <a:p>
+            <a:pPr indent="0" lvl="0" marL="0" rtl="0" algn="ctr">
+              <a:spcBef>
+                <a:spcPts val="0"/>
+              </a:spcBef>
+              <a:spcAft>
+                <a:spcPts val="0"/>
+              </a:spcAft>
+              <a:buNone/>
+            </a:pPr>
+            <a:r>
+              <a:rPr b="1" lang="en" sz="2600">
+                <a:solidFill>
+                  <a:srgbClr val="E3FEF7"/>
+                </a:solidFill>
+              </a:rPr>
+              <a:t>Enforcement Mechanisms</a:t>
+            </a:r>
+            <a:endParaRPr b="1" sz="2600">
+              <a:solidFill>
+                <a:srgbClr val="E3FEF7"/>
+              </a:solidFill>
+            </a:endParaRPr>
+          </a:p>
+        </p:txBody>
+      </p:sp>
     </p:spTree>
   </p:cSld>
   <p:clrMapOvr>
@@ -8392,7 +9121,7 @@
     </p:bg>
     <p:spTree>
       <p:nvGrpSpPr>
-        <p:cNvPr id="156" name="Shape 156"/>
+        <p:cNvPr id="157" name="Shape 157"/>
         <p:cNvGrpSpPr/>
         <p:nvPr/>
       </p:nvGrpSpPr>
@@ -8406,7 +9135,7 @@
       </p:grpSpPr>
       <p:sp>
         <p:nvSpPr>
-          <p:cNvPr id="157" name="Google Shape;157;p28"/>
+          <p:cNvPr id="158" name="Google Shape;158;p28"/>
           <p:cNvSpPr txBox="1"/>
           <p:nvPr/>
         </p:nvSpPr>
@@ -8444,7 +9173,7 @@
                   <a:srgbClr val="E3FEF7"/>
                 </a:solidFill>
               </a:rPr>
-              <a:t>Conclusions</a:t>
+              <a:t>Implementation Approaches</a:t>
             </a:r>
             <a:endParaRPr b="1" sz="4000">
               <a:solidFill>
@@ -8456,7 +9185,7 @@
       </p:sp>
       <p:sp>
         <p:nvSpPr>
-          <p:cNvPr id="158" name="Google Shape;158;p28"/>
+          <p:cNvPr id="159" name="Google Shape;159;p28"/>
           <p:cNvSpPr txBox="1"/>
           <p:nvPr/>
         </p:nvSpPr>
@@ -8497,6 +9226,56 @@
               <a:t>Write here.</a:t>
             </a:r>
             <a:endParaRPr i="1" sz="1800">
+              <a:solidFill>
+                <a:srgbClr val="E3FEF7"/>
+              </a:solidFill>
+            </a:endParaRPr>
+          </a:p>
+        </p:txBody>
+      </p:sp>
+      <p:sp>
+        <p:nvSpPr>
+          <p:cNvPr id="160" name="Google Shape;160;p28"/>
+          <p:cNvSpPr txBox="1"/>
+          <p:nvPr/>
+        </p:nvSpPr>
+        <p:spPr>
+          <a:xfrm>
+            <a:off x="0" y="1061700"/>
+            <a:ext cx="9144000" cy="495600"/>
+          </a:xfrm>
+          <a:prstGeom prst="rect">
+            <a:avLst/>
+          </a:prstGeom>
+          <a:noFill/>
+          <a:ln>
+            <a:noFill/>
+          </a:ln>
+        </p:spPr>
+        <p:txBody>
+          <a:bodyPr anchorCtr="0" anchor="ctr" bIns="91425" lIns="91425" spcFirstLastPara="1" rIns="91425" wrap="square" tIns="91425">
+            <a:noAutofit/>
+          </a:bodyPr>
+          <a:lstStyle/>
+          <a:p>
+            <a:pPr indent="0" lvl="0" marL="0" rtl="0" algn="ctr">
+              <a:spcBef>
+                <a:spcPts val="0"/>
+              </a:spcBef>
+              <a:spcAft>
+                <a:spcPts val="0"/>
+              </a:spcAft>
+              <a:buNone/>
+            </a:pPr>
+            <a:r>
+              <a:rPr b="1" lang="en" sz="2600">
+                <a:solidFill>
+                  <a:srgbClr val="E3FEF7"/>
+                </a:solidFill>
+              </a:rPr>
+              <a:t>Performance Considerations</a:t>
+            </a:r>
+            <a:endParaRPr b="1" sz="2600">
               <a:solidFill>
                 <a:srgbClr val="E3FEF7"/>
               </a:solidFill>
@@ -8524,7 +9303,7 @@
     </p:bg>
     <p:spTree>
       <p:nvGrpSpPr>
-        <p:cNvPr id="162" name="Shape 162"/>
+        <p:cNvPr id="164" name="Shape 164"/>
         <p:cNvGrpSpPr/>
         <p:nvPr/>
       </p:nvGrpSpPr>
@@ -8538,7 +9317,7 @@
       </p:grpSpPr>
       <p:sp>
         <p:nvSpPr>
-          <p:cNvPr id="163" name="Google Shape;163;p29"/>
+          <p:cNvPr id="165" name="Google Shape;165;p29"/>
           <p:cNvSpPr txBox="1"/>
           <p:nvPr/>
         </p:nvSpPr>
@@ -8576,7 +9355,7 @@
                   <a:srgbClr val="E3FEF7"/>
                 </a:solidFill>
               </a:rPr>
-              <a:t>References</a:t>
+              <a:t>Case Studies</a:t>
             </a:r>
             <a:endParaRPr b="1" sz="4000">
               <a:solidFill>
@@ -8588,7 +9367,271 @@
       </p:sp>
       <p:sp>
         <p:nvSpPr>
-          <p:cNvPr id="164" name="Google Shape;164;p29"/>
+          <p:cNvPr id="166" name="Google Shape;166;p29"/>
+          <p:cNvSpPr txBox="1"/>
+          <p:nvPr/>
+        </p:nvSpPr>
+        <p:spPr>
+          <a:xfrm>
+            <a:off x="479750" y="1793125"/>
+            <a:ext cx="8234400" cy="2917800"/>
+          </a:xfrm>
+          <a:prstGeom prst="rect">
+            <a:avLst/>
+          </a:prstGeom>
+          <a:noFill/>
+          <a:ln>
+            <a:noFill/>
+          </a:ln>
+        </p:spPr>
+        <p:txBody>
+          <a:bodyPr anchorCtr="0" anchor="ctr" bIns="91425" lIns="91425" spcFirstLastPara="1" rIns="91425" wrap="square" tIns="91425">
+            <a:noAutofit/>
+          </a:bodyPr>
+          <a:lstStyle/>
+          <a:p>
+            <a:pPr indent="0" lvl="0" marL="0" rtl="0" algn="ctr">
+              <a:spcBef>
+                <a:spcPts val="0"/>
+              </a:spcBef>
+              <a:spcAft>
+                <a:spcPts val="0"/>
+              </a:spcAft>
+              <a:buNone/>
+            </a:pPr>
+            <a:r>
+              <a:rPr lang="en" sz="1800">
+                <a:solidFill>
+                  <a:srgbClr val="E3FEF7"/>
+                </a:solidFill>
+              </a:rPr>
+              <a:t>Write here.</a:t>
+            </a:r>
+            <a:endParaRPr i="1" sz="1800">
+              <a:solidFill>
+                <a:srgbClr val="E3FEF7"/>
+              </a:solidFill>
+            </a:endParaRPr>
+          </a:p>
+        </p:txBody>
+      </p:sp>
+    </p:spTree>
+  </p:cSld>
+  <p:clrMapOvr>
+    <a:masterClrMapping/>
+  </p:clrMapOvr>
+</p:sld>
+</file>
+
+<file path=ppt/slides/slide18.xml><?xml version="1.0" encoding="utf-8"?>
+<p:sld xmlns:a="http://schemas.openxmlformats.org/drawingml/2006/main" xmlns:r="http://schemas.openxmlformats.org/officeDocument/2006/relationships" xmlns:mc="http://schemas.openxmlformats.org/markup-compatibility/2006" xmlns:mv="urn:schemas-microsoft-com:mac:vml" xmlns:p="http://schemas.openxmlformats.org/presentationml/2006/main" xmlns:c="http://schemas.openxmlformats.org/drawingml/2006/chart" xmlns:dgm="http://schemas.openxmlformats.org/drawingml/2006/diagram" xmlns:o="urn:schemas-microsoft-com:office:office" xmlns:v="urn:schemas-microsoft-com:vml" xmlns:pvml="urn:schemas-microsoft-com:office:powerpoint" xmlns:com="http://schemas.openxmlformats.org/drawingml/2006/compatibility" xmlns:p14="http://schemas.microsoft.com/office/powerpoint/2010/main" xmlns:p15="http://schemas.microsoft.com/office/powerpoint/2012/main" xmlns:ahyp="http://schemas.microsoft.com/office/drawing/2018/hyperlinkcolor">
+  <p:cSld>
+    <p:bg>
+      <p:bgPr>
+        <a:solidFill>
+          <a:srgbClr val="003C43"/>
+        </a:solidFill>
+      </p:bgPr>
+    </p:bg>
+    <p:spTree>
+      <p:nvGrpSpPr>
+        <p:cNvPr id="170" name="Shape 170"/>
+        <p:cNvGrpSpPr/>
+        <p:nvPr/>
+      </p:nvGrpSpPr>
+      <p:grpSpPr>
+        <a:xfrm>
+          <a:off x="0" y="0"/>
+          <a:ext cx="0" cy="0"/>
+          <a:chOff x="0" y="0"/>
+          <a:chExt cx="0" cy="0"/>
+        </a:xfrm>
+      </p:grpSpPr>
+      <p:sp>
+        <p:nvSpPr>
+          <p:cNvPr id="171" name="Google Shape;171;p30"/>
+          <p:cNvSpPr txBox="1"/>
+          <p:nvPr/>
+        </p:nvSpPr>
+        <p:spPr>
+          <a:xfrm>
+            <a:off x="0" y="180900"/>
+            <a:ext cx="9144000" cy="880800"/>
+          </a:xfrm>
+          <a:prstGeom prst="rect">
+            <a:avLst/>
+          </a:prstGeom>
+          <a:noFill/>
+          <a:ln>
+            <a:noFill/>
+          </a:ln>
+        </p:spPr>
+        <p:txBody>
+          <a:bodyPr anchorCtr="0" anchor="ctr" bIns="91425" lIns="91425" spcFirstLastPara="1" rIns="91425" wrap="square" tIns="91425">
+            <a:noAutofit/>
+          </a:bodyPr>
+          <a:lstStyle/>
+          <a:p>
+            <a:pPr indent="0" lvl="0" marL="0" rtl="0" algn="ctr">
+              <a:spcBef>
+                <a:spcPts val="0"/>
+              </a:spcBef>
+              <a:spcAft>
+                <a:spcPts val="0"/>
+              </a:spcAft>
+              <a:buNone/>
+            </a:pPr>
+            <a:r>
+              <a:rPr b="1" lang="en" sz="4000">
+                <a:solidFill>
+                  <a:srgbClr val="E3FEF7"/>
+                </a:solidFill>
+              </a:rPr>
+              <a:t>Conclusions</a:t>
+            </a:r>
+            <a:endParaRPr b="1" sz="4000">
+              <a:solidFill>
+                <a:srgbClr val="E3FEF7"/>
+              </a:solidFill>
+            </a:endParaRPr>
+          </a:p>
+        </p:txBody>
+      </p:sp>
+      <p:sp>
+        <p:nvSpPr>
+          <p:cNvPr id="172" name="Google Shape;172;p30"/>
+          <p:cNvSpPr txBox="1"/>
+          <p:nvPr/>
+        </p:nvSpPr>
+        <p:spPr>
+          <a:xfrm>
+            <a:off x="479750" y="1793125"/>
+            <a:ext cx="8234400" cy="2917800"/>
+          </a:xfrm>
+          <a:prstGeom prst="rect">
+            <a:avLst/>
+          </a:prstGeom>
+          <a:noFill/>
+          <a:ln>
+            <a:noFill/>
+          </a:ln>
+        </p:spPr>
+        <p:txBody>
+          <a:bodyPr anchorCtr="0" anchor="ctr" bIns="91425" lIns="91425" spcFirstLastPara="1" rIns="91425" wrap="square" tIns="91425">
+            <a:noAutofit/>
+          </a:bodyPr>
+          <a:lstStyle/>
+          <a:p>
+            <a:pPr indent="0" lvl="0" marL="0" rtl="0" algn="ctr">
+              <a:spcBef>
+                <a:spcPts val="0"/>
+              </a:spcBef>
+              <a:spcAft>
+                <a:spcPts val="0"/>
+              </a:spcAft>
+              <a:buNone/>
+            </a:pPr>
+            <a:r>
+              <a:rPr lang="en" sz="1800">
+                <a:solidFill>
+                  <a:srgbClr val="E3FEF7"/>
+                </a:solidFill>
+              </a:rPr>
+              <a:t>Write here.</a:t>
+            </a:r>
+            <a:endParaRPr i="1" sz="1800">
+              <a:solidFill>
+                <a:srgbClr val="E3FEF7"/>
+              </a:solidFill>
+            </a:endParaRPr>
+          </a:p>
+        </p:txBody>
+      </p:sp>
+    </p:spTree>
+  </p:cSld>
+  <p:clrMapOvr>
+    <a:masterClrMapping/>
+  </p:clrMapOvr>
+</p:sld>
+</file>
+
+<file path=ppt/slides/slide19.xml><?xml version="1.0" encoding="utf-8"?>
+<p:sld xmlns:a="http://schemas.openxmlformats.org/drawingml/2006/main" xmlns:r="http://schemas.openxmlformats.org/officeDocument/2006/relationships" xmlns:mc="http://schemas.openxmlformats.org/markup-compatibility/2006" xmlns:mv="urn:schemas-microsoft-com:mac:vml" xmlns:p="http://schemas.openxmlformats.org/presentationml/2006/main" xmlns:c="http://schemas.openxmlformats.org/drawingml/2006/chart" xmlns:dgm="http://schemas.openxmlformats.org/drawingml/2006/diagram" xmlns:o="urn:schemas-microsoft-com:office:office" xmlns:v="urn:schemas-microsoft-com:vml" xmlns:pvml="urn:schemas-microsoft-com:office:powerpoint" xmlns:com="http://schemas.openxmlformats.org/drawingml/2006/compatibility" xmlns:p14="http://schemas.microsoft.com/office/powerpoint/2010/main" xmlns:p15="http://schemas.microsoft.com/office/powerpoint/2012/main" xmlns:ahyp="http://schemas.microsoft.com/office/drawing/2018/hyperlinkcolor">
+  <p:cSld>
+    <p:bg>
+      <p:bgPr>
+        <a:solidFill>
+          <a:srgbClr val="003C43"/>
+        </a:solidFill>
+      </p:bgPr>
+    </p:bg>
+    <p:spTree>
+      <p:nvGrpSpPr>
+        <p:cNvPr id="176" name="Shape 176"/>
+        <p:cNvGrpSpPr/>
+        <p:nvPr/>
+      </p:nvGrpSpPr>
+      <p:grpSpPr>
+        <a:xfrm>
+          <a:off x="0" y="0"/>
+          <a:ext cx="0" cy="0"/>
+          <a:chOff x="0" y="0"/>
+          <a:chExt cx="0" cy="0"/>
+        </a:xfrm>
+      </p:grpSpPr>
+      <p:sp>
+        <p:nvSpPr>
+          <p:cNvPr id="177" name="Google Shape;177;p31"/>
+          <p:cNvSpPr txBox="1"/>
+          <p:nvPr/>
+        </p:nvSpPr>
+        <p:spPr>
+          <a:xfrm>
+            <a:off x="0" y="180900"/>
+            <a:ext cx="9144000" cy="880800"/>
+          </a:xfrm>
+          <a:prstGeom prst="rect">
+            <a:avLst/>
+          </a:prstGeom>
+          <a:noFill/>
+          <a:ln>
+            <a:noFill/>
+          </a:ln>
+        </p:spPr>
+        <p:txBody>
+          <a:bodyPr anchorCtr="0" anchor="ctr" bIns="91425" lIns="91425" spcFirstLastPara="1" rIns="91425" wrap="square" tIns="91425">
+            <a:noAutofit/>
+          </a:bodyPr>
+          <a:lstStyle/>
+          <a:p>
+            <a:pPr indent="0" lvl="0" marL="0" rtl="0" algn="ctr">
+              <a:spcBef>
+                <a:spcPts val="0"/>
+              </a:spcBef>
+              <a:spcAft>
+                <a:spcPts val="0"/>
+              </a:spcAft>
+              <a:buNone/>
+            </a:pPr>
+            <a:r>
+              <a:rPr b="1" lang="en" sz="4000">
+                <a:solidFill>
+                  <a:srgbClr val="E3FEF7"/>
+                </a:solidFill>
+              </a:rPr>
+              <a:t>References</a:t>
+            </a:r>
+            <a:endParaRPr b="1" sz="4000">
+              <a:solidFill>
+                <a:srgbClr val="E3FEF7"/>
+              </a:solidFill>
+            </a:endParaRPr>
+          </a:p>
+        </p:txBody>
+      </p:sp>
+      <p:sp>
+        <p:nvSpPr>
+          <p:cNvPr id="178" name="Google Shape;178;p31"/>
           <p:cNvSpPr txBox="1"/>
           <p:nvPr/>
         </p:nvSpPr>

</xml_diff>